<commit_message>
getting ready to add code and added beginning of presentation
</commit_message>
<xml_diff>
--- a/Presentation/Presentation E-Portfolio ES8266.pptx
+++ b/Presentation/Presentation E-Portfolio ES8266.pptx
@@ -8,7 +8,16 @@
     <p:sldId id="256" r:id="rId2"/>
     <p:sldId id="257" r:id="rId3"/>
     <p:sldId id="258" r:id="rId4"/>
-    <p:sldId id="259" r:id="rId5"/>
+    <p:sldId id="261" r:id="rId5"/>
+    <p:sldId id="259" r:id="rId6"/>
+    <p:sldId id="260" r:id="rId7"/>
+    <p:sldId id="262" r:id="rId8"/>
+    <p:sldId id="263" r:id="rId9"/>
+    <p:sldId id="264" r:id="rId10"/>
+    <p:sldId id="265" r:id="rId11"/>
+    <p:sldId id="266" r:id="rId12"/>
+    <p:sldId id="267" r:id="rId13"/>
+    <p:sldId id="268" r:id="rId14"/>
   </p:sldIdLst>
   <p:sldSz cx="9144000" cy="6858000" type="screen4x3"/>
   <p:notesSz cx="6858000" cy="9144000"/>
@@ -391,7 +400,7 @@
             <a:fld id="{1BA50D42-C9CD-4801-B293-61D1F53EC57E}" type="datetimeFigureOut">
               <a:rPr lang="de-DE" smtClean="0"/>
               <a:pPr/>
-              <a:t>06.06.2018</a:t>
+              <a:t>13.06.2018</a:t>
             </a:fld>
             <a:endParaRPr lang="de-DE"/>
           </a:p>
@@ -786,7 +795,7 @@
             <a:fld id="{1BA50D42-C9CD-4801-B293-61D1F53EC57E}" type="datetimeFigureOut">
               <a:rPr lang="de-DE" smtClean="0"/>
               <a:pPr/>
-              <a:t>06.06.2018</a:t>
+              <a:t>13.06.2018</a:t>
             </a:fld>
             <a:endParaRPr lang="de-DE"/>
           </a:p>
@@ -1321,7 +1330,7 @@
             <a:fld id="{1BA50D42-C9CD-4801-B293-61D1F53EC57E}" type="datetimeFigureOut">
               <a:rPr lang="de-DE" smtClean="0"/>
               <a:pPr/>
-              <a:t>06.06.2018</a:t>
+              <a:t>13.06.2018</a:t>
             </a:fld>
             <a:endParaRPr lang="de-DE"/>
           </a:p>
@@ -1455,7 +1464,7 @@
             <a:fld id="{1BA50D42-C9CD-4801-B293-61D1F53EC57E}" type="datetimeFigureOut">
               <a:rPr lang="de-DE" smtClean="0"/>
               <a:pPr/>
-              <a:t>06.06.2018</a:t>
+              <a:t>13.06.2018</a:t>
             </a:fld>
             <a:endParaRPr lang="de-DE"/>
           </a:p>
@@ -2000,7 +2009,7 @@
             <a:fld id="{1BA50D42-C9CD-4801-B293-61D1F53EC57E}" type="datetimeFigureOut">
               <a:rPr lang="de-DE" smtClean="0"/>
               <a:pPr/>
-              <a:t>06.06.2018</a:t>
+              <a:t>13.06.2018</a:t>
             </a:fld>
             <a:endParaRPr lang="de-DE"/>
           </a:p>
@@ -2297,7 +2306,7 @@
             <a:fld id="{1BA50D42-C9CD-4801-B293-61D1F53EC57E}" type="datetimeFigureOut">
               <a:rPr lang="de-DE" smtClean="0"/>
               <a:pPr/>
-              <a:t>06.06.2018</a:t>
+              <a:t>13.06.2018</a:t>
             </a:fld>
             <a:endParaRPr lang="de-DE"/>
           </a:p>
@@ -2958,7 +2967,7 @@
             <a:fld id="{1BA50D42-C9CD-4801-B293-61D1F53EC57E}" type="datetimeFigureOut">
               <a:rPr lang="de-DE" smtClean="0"/>
               <a:pPr/>
-              <a:t>06.06.2018</a:t>
+              <a:t>13.06.2018</a:t>
             </a:fld>
             <a:endParaRPr lang="de-DE"/>
           </a:p>
@@ -3396,7 +3405,7 @@
             <a:fld id="{1BA50D42-C9CD-4801-B293-61D1F53EC57E}" type="datetimeFigureOut">
               <a:rPr lang="de-DE" smtClean="0"/>
               <a:pPr/>
-              <a:t>06.06.2018</a:t>
+              <a:t>13.06.2018</a:t>
             </a:fld>
             <a:endParaRPr lang="de-DE"/>
           </a:p>
@@ -3711,7 +3720,7 @@
             <a:fld id="{1BA50D42-C9CD-4801-B293-61D1F53EC57E}" type="datetimeFigureOut">
               <a:rPr lang="de-DE" smtClean="0"/>
               <a:pPr/>
-              <a:t>06.06.2018</a:t>
+              <a:t>13.06.2018</a:t>
             </a:fld>
             <a:endParaRPr lang="de-DE"/>
           </a:p>
@@ -4446,7 +4455,7 @@
             <a:fld id="{1BA50D42-C9CD-4801-B293-61D1F53EC57E}" type="datetimeFigureOut">
               <a:rPr lang="de-DE" smtClean="0"/>
               <a:pPr/>
-              <a:t>06.06.2018</a:t>
+              <a:t>13.06.2018</a:t>
             </a:fld>
             <a:endParaRPr lang="de-DE"/>
           </a:p>
@@ -5112,7 +5121,7 @@
             <a:fld id="{1BA50D42-C9CD-4801-B293-61D1F53EC57E}" type="datetimeFigureOut">
               <a:rPr lang="de-DE" smtClean="0"/>
               <a:pPr/>
-              <a:t>06.06.2018</a:t>
+              <a:t>13.06.2018</a:t>
             </a:fld>
             <a:endParaRPr lang="de-DE"/>
           </a:p>
@@ -5386,7 +5395,7 @@
             <a:fld id="{1BA50D42-C9CD-4801-B293-61D1F53EC57E}" type="datetimeFigureOut">
               <a:rPr lang="de-DE" smtClean="0"/>
               <a:pPr/>
-              <a:t>06.06.2018</a:t>
+              <a:t>13.06.2018</a:t>
             </a:fld>
             <a:endParaRPr lang="de-DE"/>
           </a:p>
@@ -6122,6 +6131,980 @@
 </p:sld>
 </file>
 
+<file path=ppt/slides/slide10.xml><?xml version="1.0" encoding="utf-8"?>
+<p:sld xmlns:a="http://schemas.openxmlformats.org/drawingml/2006/main" xmlns:r="http://schemas.openxmlformats.org/officeDocument/2006/relationships" xmlns:p="http://schemas.openxmlformats.org/presentationml/2006/main">
+  <p:cSld>
+    <p:spTree>
+      <p:nvGrpSpPr>
+        <p:cNvPr id="1" name=""/>
+        <p:cNvGrpSpPr/>
+        <p:nvPr/>
+      </p:nvGrpSpPr>
+      <p:grpSpPr>
+        <a:xfrm>
+          <a:off x="0" y="0"/>
+          <a:ext cx="0" cy="0"/>
+          <a:chOff x="0" y="0"/>
+          <a:chExt cx="0" cy="0"/>
+        </a:xfrm>
+      </p:grpSpPr>
+      <p:sp>
+        <p:nvSpPr>
+          <p:cNvPr id="2" name="Titel 1"/>
+          <p:cNvSpPr>
+            <a:spLocks noGrp="1"/>
+          </p:cNvSpPr>
+          <p:nvPr>
+            <p:ph type="title"/>
+          </p:nvPr>
+        </p:nvSpPr>
+        <p:spPr/>
+        <p:txBody>
+          <a:bodyPr/>
+          <a:lstStyle/>
+          <a:p>
+            <a:r>
+              <a:rPr lang="de-DE" dirty="0" smtClean="0"/>
+              <a:t>Programming</a:t>
+            </a:r>
+            <a:endParaRPr lang="de-DE" dirty="0"/>
+          </a:p>
+        </p:txBody>
+      </p:sp>
+      <p:sp>
+        <p:nvSpPr>
+          <p:cNvPr id="3" name="Inhaltsplatzhalter 2"/>
+          <p:cNvSpPr>
+            <a:spLocks noGrp="1"/>
+          </p:cNvSpPr>
+          <p:nvPr>
+            <p:ph sz="quarter" idx="1"/>
+          </p:nvPr>
+        </p:nvSpPr>
+        <p:spPr/>
+        <p:txBody>
+          <a:bodyPr/>
+          <a:lstStyle/>
+          <a:p>
+            <a:r>
+              <a:rPr lang="en-US" dirty="0" smtClean="0"/>
+              <a:t>The ESP8266WiFi.h library includes all the necessary functions such as:</a:t>
+            </a:r>
+          </a:p>
+          <a:p>
+            <a:pPr>
+              <a:buNone/>
+            </a:pPr>
+            <a:endParaRPr lang="en-US" dirty="0"/>
+          </a:p>
+        </p:txBody>
+      </p:sp>
+      <p:graphicFrame>
+        <p:nvGraphicFramePr>
+          <p:cNvPr id="4" name="Tabelle 3"/>
+          <p:cNvGraphicFramePr>
+            <a:graphicFrameLocks noGrp="1"/>
+          </p:cNvGraphicFramePr>
+          <p:nvPr/>
+        </p:nvGraphicFramePr>
+        <p:xfrm>
+          <a:off x="683568" y="2852936"/>
+          <a:ext cx="6096000" cy="2592288"/>
+        </p:xfrm>
+        <a:graphic>
+          <a:graphicData uri="http://schemas.openxmlformats.org/drawingml/2006/table">
+            <a:tbl>
+              <a:tblPr firstRow="1" bandRow="1">
+                <a:tableStyleId>{5C22544A-7EE6-4342-B048-85BDC9FD1C3A}</a:tableStyleId>
+              </a:tblPr>
+              <a:tblGrid>
+                <a:gridCol w="2952328"/>
+                <a:gridCol w="3143672"/>
+              </a:tblGrid>
+              <a:tr h="432048">
+                <a:tc>
+                  <a:txBody>
+                    <a:bodyPr/>
+                    <a:lstStyle/>
+                    <a:p>
+                      <a:r>
+                        <a:rPr lang="de-DE" dirty="0" smtClean="0"/>
+                        <a:t>Code</a:t>
+                      </a:r>
+                      <a:endParaRPr lang="de-DE" dirty="0"/>
+                    </a:p>
+                  </a:txBody>
+                  <a:tcPr/>
+                </a:tc>
+                <a:tc>
+                  <a:txBody>
+                    <a:bodyPr/>
+                    <a:lstStyle/>
+                    <a:p>
+                      <a:r>
+                        <a:rPr lang="de-DE" dirty="0" smtClean="0"/>
+                        <a:t>Description</a:t>
+                      </a:r>
+                      <a:endParaRPr lang="de-DE" dirty="0"/>
+                    </a:p>
+                  </a:txBody>
+                  <a:tcPr/>
+                </a:tc>
+              </a:tr>
+              <a:tr h="432048">
+                <a:tc>
+                  <a:txBody>
+                    <a:bodyPr/>
+                    <a:lstStyle/>
+                    <a:p>
+                      <a:r>
+                        <a:rPr lang="de-DE" dirty="0" err="1" smtClean="0"/>
+                        <a:t>WiFi.begin</a:t>
+                      </a:r>
+                      <a:r>
+                        <a:rPr lang="de-DE" dirty="0" smtClean="0"/>
+                        <a:t>(</a:t>
+                      </a:r>
+                      <a:r>
+                        <a:rPr lang="de-DE" dirty="0" err="1" smtClean="0"/>
+                        <a:t>ssid,pass</a:t>
+                      </a:r>
+                      <a:r>
+                        <a:rPr lang="de-DE" dirty="0" smtClean="0"/>
+                        <a:t>)</a:t>
+                      </a:r>
+                      <a:endParaRPr lang="de-DE" dirty="0"/>
+                    </a:p>
+                  </a:txBody>
+                  <a:tcPr/>
+                </a:tc>
+                <a:tc>
+                  <a:txBody>
+                    <a:bodyPr/>
+                    <a:lstStyle/>
+                    <a:p>
+                      <a:r>
+                        <a:rPr lang="de-DE" dirty="0" err="1" smtClean="0"/>
+                        <a:t>Connecting</a:t>
+                      </a:r>
+                      <a:r>
+                        <a:rPr lang="de-DE" baseline="0" dirty="0" smtClean="0"/>
+                        <a:t> </a:t>
+                      </a:r>
+                      <a:r>
+                        <a:rPr lang="de-DE" baseline="0" dirty="0" err="1" smtClean="0"/>
+                        <a:t>to</a:t>
+                      </a:r>
+                      <a:r>
+                        <a:rPr lang="de-DE" baseline="0" dirty="0" smtClean="0"/>
+                        <a:t> </a:t>
+                      </a:r>
+                      <a:r>
+                        <a:rPr lang="de-DE" baseline="0" dirty="0" err="1" smtClean="0"/>
+                        <a:t>network</a:t>
+                      </a:r>
+                      <a:endParaRPr lang="de-DE" dirty="0"/>
+                    </a:p>
+                  </a:txBody>
+                  <a:tcPr/>
+                </a:tc>
+              </a:tr>
+              <a:tr h="432048">
+                <a:tc>
+                  <a:txBody>
+                    <a:bodyPr/>
+                    <a:lstStyle/>
+                    <a:p>
+                      <a:r>
+                        <a:rPr lang="de-DE" dirty="0" err="1" smtClean="0"/>
+                        <a:t>WiFi.disconnect</a:t>
+                      </a:r>
+                      <a:r>
+                        <a:rPr lang="de-DE" dirty="0" smtClean="0"/>
+                        <a:t>()</a:t>
+                      </a:r>
+                      <a:endParaRPr lang="de-DE" dirty="0"/>
+                    </a:p>
+                  </a:txBody>
+                  <a:tcPr/>
+                </a:tc>
+                <a:tc>
+                  <a:txBody>
+                    <a:bodyPr/>
+                    <a:lstStyle/>
+                    <a:p>
+                      <a:r>
+                        <a:rPr lang="de-DE" dirty="0" err="1" smtClean="0"/>
+                        <a:t>Disconnecting</a:t>
+                      </a:r>
+                      <a:endParaRPr lang="de-DE" dirty="0"/>
+                    </a:p>
+                  </a:txBody>
+                  <a:tcPr/>
+                </a:tc>
+              </a:tr>
+              <a:tr h="432048">
+                <a:tc>
+                  <a:txBody>
+                    <a:bodyPr/>
+                    <a:lstStyle/>
+                    <a:p>
+                      <a:r>
+                        <a:rPr lang="de-DE" dirty="0" err="1" smtClean="0"/>
+                        <a:t>WiFi.scanNetworks</a:t>
+                      </a:r>
+                      <a:r>
+                        <a:rPr lang="de-DE" dirty="0" smtClean="0"/>
+                        <a:t>()</a:t>
+                      </a:r>
+                      <a:endParaRPr lang="de-DE" dirty="0"/>
+                    </a:p>
+                  </a:txBody>
+                  <a:tcPr/>
+                </a:tc>
+                <a:tc>
+                  <a:txBody>
+                    <a:bodyPr/>
+                    <a:lstStyle/>
+                    <a:p>
+                      <a:r>
+                        <a:rPr lang="de-DE" dirty="0" smtClean="0"/>
+                        <a:t>Scanning </a:t>
+                      </a:r>
+                      <a:r>
+                        <a:rPr lang="de-DE" baseline="0" dirty="0" err="1" smtClean="0"/>
+                        <a:t>available</a:t>
+                      </a:r>
+                      <a:r>
+                        <a:rPr lang="de-DE" baseline="0" dirty="0" smtClean="0"/>
+                        <a:t> </a:t>
+                      </a:r>
+                      <a:r>
+                        <a:rPr lang="de-DE" baseline="0" dirty="0" err="1" smtClean="0"/>
+                        <a:t>networks</a:t>
+                      </a:r>
+                      <a:endParaRPr lang="de-DE" dirty="0"/>
+                    </a:p>
+                  </a:txBody>
+                  <a:tcPr/>
+                </a:tc>
+              </a:tr>
+              <a:tr h="432048">
+                <a:tc>
+                  <a:txBody>
+                    <a:bodyPr/>
+                    <a:lstStyle/>
+                    <a:p>
+                      <a:r>
+                        <a:rPr lang="de-DE" dirty="0" err="1" smtClean="0"/>
+                        <a:t>WiFiClient</a:t>
+                      </a:r>
+                      <a:r>
+                        <a:rPr lang="de-DE" baseline="0" dirty="0" smtClean="0"/>
+                        <a:t> </a:t>
+                      </a:r>
+                      <a:r>
+                        <a:rPr lang="de-DE" baseline="0" dirty="0" err="1" smtClean="0"/>
+                        <a:t>client</a:t>
+                      </a:r>
+                      <a:endParaRPr lang="de-DE" dirty="0"/>
+                    </a:p>
+                  </a:txBody>
+                  <a:tcPr/>
+                </a:tc>
+                <a:tc>
+                  <a:txBody>
+                    <a:bodyPr/>
+                    <a:lstStyle/>
+                    <a:p>
+                      <a:r>
+                        <a:rPr lang="de-DE" dirty="0" err="1" smtClean="0"/>
+                        <a:t>Creating</a:t>
+                      </a:r>
+                      <a:r>
+                        <a:rPr lang="de-DE" dirty="0" smtClean="0"/>
+                        <a:t> </a:t>
+                      </a:r>
+                      <a:r>
+                        <a:rPr lang="de-DE" dirty="0" err="1" smtClean="0"/>
+                        <a:t>client</a:t>
+                      </a:r>
+                      <a:r>
+                        <a:rPr lang="de-DE" dirty="0" smtClean="0"/>
+                        <a:t> </a:t>
+                      </a:r>
+                      <a:r>
+                        <a:rPr lang="de-DE" dirty="0" err="1" smtClean="0"/>
+                        <a:t>for</a:t>
+                      </a:r>
+                      <a:r>
+                        <a:rPr lang="de-DE" dirty="0" smtClean="0"/>
+                        <a:t> </a:t>
+                      </a:r>
+                      <a:r>
+                        <a:rPr lang="de-DE" dirty="0" err="1" smtClean="0"/>
+                        <a:t>requests</a:t>
+                      </a:r>
+                      <a:endParaRPr lang="de-DE" dirty="0"/>
+                    </a:p>
+                  </a:txBody>
+                  <a:tcPr/>
+                </a:tc>
+              </a:tr>
+              <a:tr h="432048">
+                <a:tc>
+                  <a:txBody>
+                    <a:bodyPr/>
+                    <a:lstStyle/>
+                    <a:p>
+                      <a:r>
+                        <a:rPr lang="de-DE" dirty="0" err="1" smtClean="0"/>
+                        <a:t>WiFiServer</a:t>
+                      </a:r>
+                      <a:r>
+                        <a:rPr lang="de-DE" dirty="0" smtClean="0"/>
+                        <a:t> </a:t>
+                      </a:r>
+                      <a:r>
+                        <a:rPr lang="de-DE" dirty="0" err="1" smtClean="0"/>
+                        <a:t>server</a:t>
+                      </a:r>
+                      <a:r>
+                        <a:rPr lang="de-DE" dirty="0" smtClean="0"/>
+                        <a:t>(</a:t>
+                      </a:r>
+                      <a:r>
+                        <a:rPr lang="de-DE" dirty="0" err="1" smtClean="0"/>
+                        <a:t>port</a:t>
+                      </a:r>
+                      <a:r>
+                        <a:rPr lang="de-DE" dirty="0" smtClean="0"/>
+                        <a:t>)</a:t>
+                      </a:r>
+                      <a:endParaRPr lang="de-DE" dirty="0"/>
+                    </a:p>
+                  </a:txBody>
+                  <a:tcPr/>
+                </a:tc>
+                <a:tc>
+                  <a:txBody>
+                    <a:bodyPr/>
+                    <a:lstStyle/>
+                    <a:p>
+                      <a:r>
+                        <a:rPr lang="de-DE" dirty="0" err="1" smtClean="0"/>
+                        <a:t>Creating</a:t>
+                      </a:r>
+                      <a:r>
+                        <a:rPr lang="de-DE" baseline="0" dirty="0" smtClean="0"/>
+                        <a:t> </a:t>
+                      </a:r>
+                      <a:r>
+                        <a:rPr lang="de-DE" baseline="0" dirty="0" err="1" smtClean="0"/>
+                        <a:t>server</a:t>
+                      </a:r>
+                      <a:endParaRPr lang="de-DE" dirty="0"/>
+                    </a:p>
+                  </a:txBody>
+                  <a:tcPr/>
+                </a:tc>
+              </a:tr>
+            </a:tbl>
+          </a:graphicData>
+        </a:graphic>
+      </p:graphicFrame>
+    </p:spTree>
+  </p:cSld>
+  <p:clrMapOvr>
+    <a:masterClrMapping/>
+  </p:clrMapOvr>
+</p:sld>
+</file>
+
+<file path=ppt/slides/slide11.xml><?xml version="1.0" encoding="utf-8"?>
+<p:sld xmlns:a="http://schemas.openxmlformats.org/drawingml/2006/main" xmlns:r="http://schemas.openxmlformats.org/officeDocument/2006/relationships" xmlns:p="http://schemas.openxmlformats.org/presentationml/2006/main">
+  <p:cSld>
+    <p:spTree>
+      <p:nvGrpSpPr>
+        <p:cNvPr id="1" name=""/>
+        <p:cNvGrpSpPr/>
+        <p:nvPr/>
+      </p:nvGrpSpPr>
+      <p:grpSpPr>
+        <a:xfrm>
+          <a:off x="0" y="0"/>
+          <a:ext cx="0" cy="0"/>
+          <a:chOff x="0" y="0"/>
+          <a:chExt cx="0" cy="0"/>
+        </a:xfrm>
+      </p:grpSpPr>
+      <p:sp>
+        <p:nvSpPr>
+          <p:cNvPr id="2" name="Titel 1"/>
+          <p:cNvSpPr>
+            <a:spLocks noGrp="1"/>
+          </p:cNvSpPr>
+          <p:nvPr>
+            <p:ph type="title"/>
+          </p:nvPr>
+        </p:nvSpPr>
+        <p:spPr/>
+        <p:txBody>
+          <a:bodyPr/>
+          <a:lstStyle/>
+          <a:p>
+            <a:r>
+              <a:rPr lang="de-DE" dirty="0" smtClean="0"/>
+              <a:t>Programming – Minimal </a:t>
+            </a:r>
+            <a:r>
+              <a:rPr lang="de-DE" dirty="0" err="1" smtClean="0"/>
+              <a:t>Example</a:t>
+            </a:r>
+            <a:endParaRPr lang="de-DE" dirty="0"/>
+          </a:p>
+        </p:txBody>
+      </p:sp>
+      <p:pic>
+        <p:nvPicPr>
+          <p:cNvPr id="4" name="Inhaltsplatzhalter 3" descr="MinimalCode.PNG"/>
+          <p:cNvPicPr>
+            <a:picLocks noGrp="1" noChangeAspect="1"/>
+          </p:cNvPicPr>
+          <p:nvPr>
+            <p:ph sz="quarter" idx="1"/>
+          </p:nvPr>
+        </p:nvPicPr>
+        <p:blipFill>
+          <a:blip r:embed="rId2" cstate="print"/>
+          <a:stretch>
+            <a:fillRect/>
+          </a:stretch>
+        </p:blipFill>
+        <p:spPr>
+          <a:xfrm>
+            <a:off x="2376977" y="1855514"/>
+            <a:ext cx="4353533" cy="3915322"/>
+          </a:xfrm>
+        </p:spPr>
+      </p:pic>
+    </p:spTree>
+  </p:cSld>
+  <p:clrMapOvr>
+    <a:masterClrMapping/>
+  </p:clrMapOvr>
+</p:sld>
+</file>
+
+<file path=ppt/slides/slide12.xml><?xml version="1.0" encoding="utf-8"?>
+<p:sld xmlns:a="http://schemas.openxmlformats.org/drawingml/2006/main" xmlns:r="http://schemas.openxmlformats.org/officeDocument/2006/relationships" xmlns:p="http://schemas.openxmlformats.org/presentationml/2006/main">
+  <p:cSld>
+    <p:spTree>
+      <p:nvGrpSpPr>
+        <p:cNvPr id="1" name=""/>
+        <p:cNvGrpSpPr/>
+        <p:nvPr/>
+      </p:nvGrpSpPr>
+      <p:grpSpPr>
+        <a:xfrm>
+          <a:off x="0" y="0"/>
+          <a:ext cx="0" cy="0"/>
+          <a:chOff x="0" y="0"/>
+          <a:chExt cx="0" cy="0"/>
+        </a:xfrm>
+      </p:grpSpPr>
+      <p:sp>
+        <p:nvSpPr>
+          <p:cNvPr id="2" name="Titel 1"/>
+          <p:cNvSpPr>
+            <a:spLocks noGrp="1"/>
+          </p:cNvSpPr>
+          <p:nvPr>
+            <p:ph type="title"/>
+          </p:nvPr>
+        </p:nvSpPr>
+        <p:spPr/>
+        <p:txBody>
+          <a:bodyPr/>
+          <a:lstStyle/>
+          <a:p>
+            <a:r>
+              <a:rPr lang="de-DE" dirty="0" smtClean="0"/>
+              <a:t>Communication </a:t>
+            </a:r>
+            <a:r>
+              <a:rPr lang="de-DE" dirty="0" err="1" smtClean="0"/>
+              <a:t>to</a:t>
+            </a:r>
+            <a:r>
+              <a:rPr lang="de-DE" dirty="0" smtClean="0"/>
+              <a:t> </a:t>
+            </a:r>
+            <a:r>
+              <a:rPr lang="de-DE" dirty="0" err="1" smtClean="0"/>
+              <a:t>other</a:t>
+            </a:r>
+            <a:r>
+              <a:rPr lang="de-DE" dirty="0" smtClean="0"/>
+              <a:t> </a:t>
+            </a:r>
+            <a:r>
+              <a:rPr lang="de-DE" dirty="0" err="1" smtClean="0"/>
+              <a:t>devices</a:t>
+            </a:r>
+            <a:r>
+              <a:rPr lang="de-DE" dirty="0" smtClean="0"/>
+              <a:t> / </a:t>
+            </a:r>
+            <a:r>
+              <a:rPr lang="de-DE" dirty="0" err="1" smtClean="0"/>
+              <a:t>Arduino</a:t>
+            </a:r>
+            <a:endParaRPr lang="de-DE" dirty="0"/>
+          </a:p>
+        </p:txBody>
+      </p:sp>
+      <p:sp>
+        <p:nvSpPr>
+          <p:cNvPr id="5" name="Inhaltsplatzhalter 4"/>
+          <p:cNvSpPr>
+            <a:spLocks noGrp="1"/>
+          </p:cNvSpPr>
+          <p:nvPr>
+            <p:ph sz="quarter" idx="1"/>
+          </p:nvPr>
+        </p:nvSpPr>
+        <p:spPr/>
+        <p:txBody>
+          <a:bodyPr/>
+          <a:lstStyle/>
+          <a:p>
+            <a:r>
+              <a:rPr lang="de-DE" dirty="0" err="1" smtClean="0"/>
+              <a:t>What</a:t>
+            </a:r>
+            <a:r>
+              <a:rPr lang="de-DE" dirty="0" smtClean="0"/>
+              <a:t> </a:t>
+            </a:r>
+            <a:r>
+              <a:rPr lang="de-DE" dirty="0" err="1" smtClean="0"/>
+              <a:t>to</a:t>
+            </a:r>
+            <a:r>
+              <a:rPr lang="de-DE" dirty="0" smtClean="0"/>
+              <a:t> do </a:t>
+            </a:r>
+            <a:r>
+              <a:rPr lang="de-DE" dirty="0" err="1" smtClean="0"/>
+              <a:t>when</a:t>
+            </a:r>
+            <a:r>
+              <a:rPr lang="de-DE" dirty="0" smtClean="0"/>
+              <a:t> </a:t>
+            </a:r>
+            <a:r>
+              <a:rPr lang="de-DE" dirty="0" err="1" smtClean="0"/>
+              <a:t>you</a:t>
+            </a:r>
+            <a:r>
+              <a:rPr lang="de-DE" dirty="0" smtClean="0"/>
+              <a:t> </a:t>
+            </a:r>
+            <a:r>
+              <a:rPr lang="de-DE" dirty="0" err="1" smtClean="0"/>
+              <a:t>need</a:t>
+            </a:r>
+            <a:r>
+              <a:rPr lang="de-DE" dirty="0" smtClean="0"/>
+              <a:t> </a:t>
+            </a:r>
+            <a:r>
+              <a:rPr lang="de-DE" dirty="0" err="1" smtClean="0"/>
+              <a:t>more</a:t>
+            </a:r>
+            <a:r>
+              <a:rPr lang="de-DE" dirty="0" smtClean="0"/>
+              <a:t> </a:t>
+            </a:r>
+            <a:r>
+              <a:rPr lang="de-DE" dirty="0" err="1" smtClean="0"/>
+              <a:t>outputs</a:t>
+            </a:r>
+            <a:r>
+              <a:rPr lang="de-DE" dirty="0" smtClean="0"/>
+              <a:t>?</a:t>
+            </a:r>
+          </a:p>
+          <a:p>
+            <a:pPr lvl="1"/>
+            <a:r>
+              <a:rPr lang="de-DE" dirty="0" smtClean="0"/>
+              <a:t>Connect </a:t>
+            </a:r>
+            <a:r>
+              <a:rPr lang="de-DE" dirty="0" err="1" smtClean="0"/>
+              <a:t>the</a:t>
+            </a:r>
+            <a:r>
+              <a:rPr lang="de-DE" dirty="0" smtClean="0"/>
+              <a:t> ESP </a:t>
+            </a:r>
+            <a:r>
+              <a:rPr lang="de-DE" dirty="0" err="1" smtClean="0"/>
+              <a:t>to</a:t>
+            </a:r>
+            <a:r>
+              <a:rPr lang="de-DE" dirty="0" smtClean="0"/>
+              <a:t> </a:t>
+            </a:r>
+            <a:r>
+              <a:rPr lang="de-DE" dirty="0" err="1" smtClean="0"/>
+              <a:t>another</a:t>
+            </a:r>
+            <a:r>
+              <a:rPr lang="de-DE" dirty="0" smtClean="0"/>
+              <a:t> </a:t>
+            </a:r>
+            <a:r>
+              <a:rPr lang="de-DE" dirty="0" err="1" smtClean="0"/>
+              <a:t>microcontroller</a:t>
+            </a:r>
+            <a:endParaRPr lang="de-DE" dirty="0" smtClean="0"/>
+          </a:p>
+          <a:p>
+            <a:pPr lvl="1"/>
+            <a:endParaRPr lang="de-DE" dirty="0" smtClean="0"/>
+          </a:p>
+          <a:p>
+            <a:r>
+              <a:rPr lang="de-DE" dirty="0" err="1" smtClean="0"/>
+              <a:t>How</a:t>
+            </a:r>
+            <a:r>
+              <a:rPr lang="de-DE" dirty="0" smtClean="0"/>
+              <a:t> </a:t>
+            </a:r>
+            <a:r>
+              <a:rPr lang="de-DE" dirty="0" err="1" smtClean="0"/>
+              <a:t>to</a:t>
+            </a:r>
+            <a:r>
+              <a:rPr lang="de-DE" dirty="0" smtClean="0"/>
+              <a:t> </a:t>
+            </a:r>
+            <a:r>
+              <a:rPr lang="de-DE" dirty="0" err="1" smtClean="0"/>
+              <a:t>communicate</a:t>
+            </a:r>
+            <a:r>
+              <a:rPr lang="de-DE" dirty="0" smtClean="0"/>
+              <a:t>?</a:t>
+            </a:r>
+          </a:p>
+          <a:p>
+            <a:pPr lvl="1"/>
+            <a:r>
+              <a:rPr lang="de-DE" dirty="0" err="1" smtClean="0"/>
+              <a:t>Using</a:t>
+            </a:r>
+            <a:r>
+              <a:rPr lang="de-DE" dirty="0" smtClean="0"/>
+              <a:t> UART, </a:t>
+            </a:r>
+            <a:r>
+              <a:rPr lang="de-DE" dirty="0" err="1" smtClean="0"/>
+              <a:t>the</a:t>
+            </a:r>
+            <a:r>
+              <a:rPr lang="de-DE" dirty="0" smtClean="0"/>
+              <a:t> </a:t>
+            </a:r>
+            <a:r>
+              <a:rPr lang="de-DE" dirty="0" err="1" smtClean="0"/>
+              <a:t>arduino</a:t>
+            </a:r>
+            <a:r>
+              <a:rPr lang="de-DE" dirty="0" smtClean="0"/>
+              <a:t> </a:t>
+            </a:r>
+            <a:r>
+              <a:rPr lang="de-DE" dirty="0" err="1" smtClean="0"/>
+              <a:t>mega</a:t>
+            </a:r>
+            <a:r>
+              <a:rPr lang="de-DE" dirty="0" smtClean="0"/>
+              <a:t> e.g. </a:t>
+            </a:r>
+            <a:r>
+              <a:rPr lang="de-DE" dirty="0" err="1" smtClean="0"/>
+              <a:t>supports</a:t>
+            </a:r>
+            <a:r>
+              <a:rPr lang="de-DE" dirty="0" smtClean="0"/>
+              <a:t> </a:t>
+            </a:r>
+            <a:r>
+              <a:rPr lang="de-DE" dirty="0" err="1" smtClean="0"/>
+              <a:t>three</a:t>
+            </a:r>
+            <a:r>
+              <a:rPr lang="de-DE" dirty="0" smtClean="0"/>
+              <a:t> </a:t>
+            </a:r>
+            <a:r>
+              <a:rPr lang="de-DE" dirty="0" err="1" smtClean="0"/>
+              <a:t>hardware</a:t>
+            </a:r>
+            <a:r>
+              <a:rPr lang="de-DE" dirty="0" smtClean="0"/>
+              <a:t> </a:t>
+            </a:r>
+            <a:r>
+              <a:rPr lang="de-DE" dirty="0" err="1" smtClean="0"/>
+              <a:t>serial</a:t>
+            </a:r>
+            <a:r>
+              <a:rPr lang="de-DE" dirty="0" smtClean="0"/>
+              <a:t> </a:t>
+            </a:r>
+            <a:r>
+              <a:rPr lang="de-DE" dirty="0" err="1" smtClean="0"/>
+              <a:t>conenctions</a:t>
+            </a:r>
+            <a:endParaRPr lang="de-DE" dirty="0" smtClean="0"/>
+          </a:p>
+          <a:p>
+            <a:pPr lvl="1"/>
+            <a:r>
+              <a:rPr lang="de-DE" dirty="0" err="1" smtClean="0"/>
+              <a:t>Remember</a:t>
+            </a:r>
+            <a:r>
+              <a:rPr lang="de-DE" dirty="0" smtClean="0"/>
+              <a:t> </a:t>
+            </a:r>
+            <a:r>
+              <a:rPr lang="de-DE" dirty="0" err="1" smtClean="0"/>
+              <a:t>to</a:t>
+            </a:r>
+            <a:r>
+              <a:rPr lang="de-DE" dirty="0" smtClean="0"/>
+              <a:t> </a:t>
+            </a:r>
+            <a:r>
+              <a:rPr lang="de-DE" dirty="0" err="1" smtClean="0"/>
+              <a:t>set</a:t>
+            </a:r>
+            <a:r>
+              <a:rPr lang="de-DE" dirty="0" smtClean="0"/>
+              <a:t> </a:t>
+            </a:r>
+            <a:r>
+              <a:rPr lang="de-DE" dirty="0" err="1" smtClean="0"/>
+              <a:t>the</a:t>
+            </a:r>
+            <a:r>
+              <a:rPr lang="de-DE" dirty="0" smtClean="0"/>
+              <a:t> same </a:t>
+            </a:r>
+            <a:r>
+              <a:rPr lang="de-DE" dirty="0" err="1" smtClean="0"/>
+              <a:t>baud</a:t>
+            </a:r>
+            <a:r>
+              <a:rPr lang="de-DE" dirty="0" smtClean="0"/>
+              <a:t>-rate</a:t>
+            </a:r>
+          </a:p>
+        </p:txBody>
+      </p:sp>
+    </p:spTree>
+  </p:cSld>
+  <p:clrMapOvr>
+    <a:masterClrMapping/>
+  </p:clrMapOvr>
+</p:sld>
+</file>
+
+<file path=ppt/slides/slide13.xml><?xml version="1.0" encoding="utf-8"?>
+<p:sld xmlns:a="http://schemas.openxmlformats.org/drawingml/2006/main" xmlns:r="http://schemas.openxmlformats.org/officeDocument/2006/relationships" xmlns:p="http://schemas.openxmlformats.org/presentationml/2006/main">
+  <p:cSld>
+    <p:spTree>
+      <p:nvGrpSpPr>
+        <p:cNvPr id="1" name=""/>
+        <p:cNvGrpSpPr/>
+        <p:nvPr/>
+      </p:nvGrpSpPr>
+      <p:grpSpPr>
+        <a:xfrm>
+          <a:off x="0" y="0"/>
+          <a:ext cx="0" cy="0"/>
+          <a:chOff x="0" y="0"/>
+          <a:chExt cx="0" cy="0"/>
+        </a:xfrm>
+      </p:grpSpPr>
+      <p:sp>
+        <p:nvSpPr>
+          <p:cNvPr id="2" name="Titel 1"/>
+          <p:cNvSpPr>
+            <a:spLocks noGrp="1"/>
+          </p:cNvSpPr>
+          <p:nvPr>
+            <p:ph type="title"/>
+          </p:nvPr>
+        </p:nvSpPr>
+        <p:spPr/>
+        <p:txBody>
+          <a:bodyPr/>
+          <a:lstStyle/>
+          <a:p>
+            <a:r>
+              <a:rPr lang="de-DE" dirty="0" smtClean="0"/>
+              <a:t>Communication </a:t>
+            </a:r>
+            <a:r>
+              <a:rPr lang="de-DE" dirty="0" err="1" smtClean="0"/>
+              <a:t>to</a:t>
+            </a:r>
+            <a:r>
+              <a:rPr lang="de-DE" dirty="0" smtClean="0"/>
+              <a:t> </a:t>
+            </a:r>
+            <a:r>
+              <a:rPr lang="de-DE" dirty="0" err="1" smtClean="0"/>
+              <a:t>other</a:t>
+            </a:r>
+            <a:r>
+              <a:rPr lang="de-DE" dirty="0" smtClean="0"/>
+              <a:t> </a:t>
+            </a:r>
+            <a:r>
+              <a:rPr lang="de-DE" dirty="0" err="1" smtClean="0"/>
+              <a:t>devices</a:t>
+            </a:r>
+            <a:r>
+              <a:rPr lang="de-DE" dirty="0" smtClean="0"/>
+              <a:t> / </a:t>
+            </a:r>
+            <a:r>
+              <a:rPr lang="de-DE" dirty="0" err="1" smtClean="0"/>
+              <a:t>Arduino</a:t>
+            </a:r>
+            <a:endParaRPr lang="de-DE" dirty="0"/>
+          </a:p>
+        </p:txBody>
+      </p:sp>
+      <p:sp>
+        <p:nvSpPr>
+          <p:cNvPr id="5" name="Inhaltsplatzhalter 4"/>
+          <p:cNvSpPr>
+            <a:spLocks noGrp="1"/>
+          </p:cNvSpPr>
+          <p:nvPr>
+            <p:ph sz="quarter" idx="1"/>
+          </p:nvPr>
+        </p:nvSpPr>
+        <p:spPr/>
+        <p:txBody>
+          <a:bodyPr/>
+          <a:lstStyle/>
+          <a:p>
+            <a:r>
+              <a:rPr lang="de-DE" dirty="0" smtClean="0"/>
+              <a:t>Filter out </a:t>
+            </a:r>
+            <a:r>
+              <a:rPr lang="de-DE" dirty="0" err="1" smtClean="0"/>
+              <a:t>commands</a:t>
+            </a:r>
+            <a:r>
+              <a:rPr lang="de-DE" dirty="0" smtClean="0"/>
+              <a:t> </a:t>
+            </a:r>
+            <a:r>
+              <a:rPr lang="de-DE" dirty="0" err="1" smtClean="0"/>
+              <a:t>by</a:t>
+            </a:r>
+            <a:r>
+              <a:rPr lang="de-DE" dirty="0" smtClean="0"/>
+              <a:t> </a:t>
+            </a:r>
+            <a:r>
+              <a:rPr lang="de-DE" dirty="0" err="1" smtClean="0"/>
+              <a:t>checking</a:t>
+            </a:r>
+            <a:r>
+              <a:rPr lang="de-DE" dirty="0" smtClean="0"/>
+              <a:t> </a:t>
+            </a:r>
+            <a:r>
+              <a:rPr lang="de-DE" dirty="0" err="1" smtClean="0"/>
+              <a:t>the</a:t>
+            </a:r>
+            <a:r>
+              <a:rPr lang="de-DE" dirty="0" smtClean="0"/>
+              <a:t> </a:t>
+            </a:r>
+            <a:r>
+              <a:rPr lang="de-DE" dirty="0" err="1" smtClean="0"/>
+              <a:t>beginning</a:t>
+            </a:r>
+            <a:r>
+              <a:rPr lang="de-DE" dirty="0" smtClean="0"/>
+              <a:t> </a:t>
+            </a:r>
+            <a:r>
+              <a:rPr lang="de-DE" dirty="0" err="1" smtClean="0"/>
+              <a:t>of</a:t>
+            </a:r>
+            <a:r>
+              <a:rPr lang="de-DE" dirty="0" smtClean="0"/>
+              <a:t> </a:t>
+            </a:r>
+            <a:r>
+              <a:rPr lang="de-DE" dirty="0" err="1" smtClean="0"/>
+              <a:t>the</a:t>
+            </a:r>
+            <a:r>
+              <a:rPr lang="de-DE" dirty="0" smtClean="0"/>
+              <a:t> </a:t>
+            </a:r>
+            <a:r>
+              <a:rPr lang="de-DE" dirty="0" err="1" smtClean="0"/>
+              <a:t>message</a:t>
+            </a:r>
+            <a:r>
+              <a:rPr lang="de-DE" dirty="0" smtClean="0"/>
+              <a:t> </a:t>
+            </a:r>
+            <a:r>
+              <a:rPr lang="de-DE" dirty="0" err="1" smtClean="0"/>
+              <a:t>for</a:t>
+            </a:r>
+            <a:r>
+              <a:rPr lang="de-DE" dirty="0" smtClean="0"/>
+              <a:t> </a:t>
+            </a:r>
+            <a:r>
+              <a:rPr lang="de-DE" dirty="0" err="1" smtClean="0"/>
+              <a:t>keywords</a:t>
+            </a:r>
+            <a:r>
+              <a:rPr lang="de-DE" dirty="0" smtClean="0"/>
+              <a:t>.</a:t>
+            </a:r>
+          </a:p>
+        </p:txBody>
+      </p:sp>
+    </p:spTree>
+  </p:cSld>
+  <p:clrMapOvr>
+    <a:masterClrMapping/>
+  </p:clrMapOvr>
+</p:sld>
+</file>
+
 <file path=ppt/slides/slide2.xml><?xml version="1.0" encoding="utf-8"?>
 <p:sld xmlns:a="http://schemas.openxmlformats.org/drawingml/2006/main" xmlns:r="http://schemas.openxmlformats.org/officeDocument/2006/relationships" xmlns:p="http://schemas.openxmlformats.org/presentationml/2006/main">
   <p:cSld>
@@ -6202,46 +7185,43 @@
           </a:p>
           <a:p>
             <a:r>
-              <a:rPr lang="de-DE" dirty="0" err="1" smtClean="0"/>
-              <a:t>Usage</a:t>
+              <a:rPr lang="de-DE" dirty="0" smtClean="0"/>
+              <a:t>Setup </a:t>
+            </a:r>
+            <a:r>
+              <a:rPr lang="de-DE" dirty="0" smtClean="0"/>
+              <a:t>/ Programming</a:t>
+            </a:r>
+          </a:p>
+          <a:p>
+            <a:r>
+              <a:rPr lang="de-DE" dirty="0" smtClean="0"/>
+              <a:t>Communication </a:t>
+            </a:r>
+            <a:r>
+              <a:rPr lang="de-DE" dirty="0" err="1" smtClean="0"/>
+              <a:t>to</a:t>
+            </a:r>
+            <a:r>
+              <a:rPr lang="de-DE" dirty="0" smtClean="0"/>
+              <a:t> </a:t>
+            </a:r>
+            <a:r>
+              <a:rPr lang="de-DE" dirty="0" err="1" smtClean="0"/>
+              <a:t>Arduino</a:t>
             </a:r>
             <a:endParaRPr lang="de-DE" dirty="0" smtClean="0"/>
           </a:p>
           <a:p>
             <a:r>
-              <a:rPr lang="de-DE" dirty="0" smtClean="0"/>
-              <a:t>Setup / Programming</a:t>
-            </a:r>
-          </a:p>
-          <a:p>
-            <a:r>
-              <a:rPr lang="de-DE" dirty="0" smtClean="0"/>
-              <a:t>Communication </a:t>
-            </a:r>
-            <a:r>
-              <a:rPr lang="de-DE" dirty="0" err="1" smtClean="0"/>
-              <a:t>to</a:t>
-            </a:r>
-            <a:r>
-              <a:rPr lang="de-DE" dirty="0" smtClean="0"/>
-              <a:t> </a:t>
-            </a:r>
-            <a:r>
-              <a:rPr lang="de-DE" dirty="0" err="1" smtClean="0"/>
-              <a:t>Arduino</a:t>
+              <a:rPr lang="de-DE" dirty="0" err="1" smtClean="0"/>
+              <a:t>Examples</a:t>
             </a:r>
             <a:endParaRPr lang="de-DE" dirty="0" smtClean="0"/>
           </a:p>
           <a:p>
             <a:r>
               <a:rPr lang="de-DE" dirty="0" err="1" smtClean="0"/>
-              <a:t>Examples</a:t>
-            </a:r>
-            <a:endParaRPr lang="de-DE" dirty="0" smtClean="0"/>
-          </a:p>
-          <a:p>
-            <a:r>
-              <a:rPr lang="de-DE" smtClean="0"/>
               <a:t>Coding</a:t>
             </a:r>
             <a:endParaRPr lang="de-DE" dirty="0" smtClean="0"/>
@@ -6314,7 +7294,9 @@
         </p:nvSpPr>
         <p:spPr/>
         <p:txBody>
-          <a:bodyPr/>
+          <a:bodyPr>
+            <a:normAutofit lnSpcReduction="10000"/>
+          </a:bodyPr>
           <a:lstStyle/>
           <a:p>
             <a:r>
@@ -6349,6 +7331,57 @@
               <a:rPr lang="de-DE" dirty="0" smtClean="0"/>
               <a:t>)</a:t>
             </a:r>
+          </a:p>
+          <a:p>
+            <a:pPr lvl="1"/>
+            <a:r>
+              <a:rPr lang="de-DE" dirty="0" smtClean="0"/>
+              <a:t>Can </a:t>
+            </a:r>
+            <a:r>
+              <a:rPr lang="de-DE" dirty="0" err="1" smtClean="0"/>
+              <a:t>be</a:t>
+            </a:r>
+            <a:r>
+              <a:rPr lang="de-DE" dirty="0" smtClean="0"/>
+              <a:t> </a:t>
+            </a:r>
+            <a:r>
+              <a:rPr lang="de-DE" dirty="0" err="1" smtClean="0"/>
+              <a:t>used</a:t>
+            </a:r>
+            <a:r>
+              <a:rPr lang="de-DE" dirty="0" smtClean="0"/>
+              <a:t> a </a:t>
+            </a:r>
+            <a:r>
+              <a:rPr lang="de-DE" dirty="0" err="1" smtClean="0"/>
+              <a:t>a</a:t>
+            </a:r>
+            <a:r>
+              <a:rPr lang="de-DE" dirty="0" smtClean="0"/>
+              <a:t> web </a:t>
+            </a:r>
+            <a:r>
+              <a:rPr lang="de-DE" dirty="0" err="1" smtClean="0"/>
+              <a:t>client</a:t>
+            </a:r>
+            <a:r>
+              <a:rPr lang="de-DE" dirty="0" smtClean="0"/>
+              <a:t> </a:t>
+            </a:r>
+            <a:r>
+              <a:rPr lang="de-DE" dirty="0" err="1" smtClean="0"/>
+              <a:t>or</a:t>
+            </a:r>
+            <a:r>
+              <a:rPr lang="de-DE" dirty="0" smtClean="0"/>
+              <a:t> </a:t>
+            </a:r>
+            <a:r>
+              <a:rPr lang="de-DE" dirty="0" err="1" smtClean="0"/>
+              <a:t>server</a:t>
+            </a:r>
             <a:endParaRPr lang="de-DE" dirty="0" smtClean="0"/>
           </a:p>
           <a:p>
@@ -6370,7 +7403,11 @@
             </a:r>
             <a:r>
               <a:rPr lang="de-DE" dirty="0" smtClean="0"/>
-              <a:t> (~3€)</a:t>
+              <a:t> (~3€</a:t>
+            </a:r>
+            <a:r>
+              <a:rPr lang="de-DE" dirty="0" smtClean="0"/>
+              <a:t>)</a:t>
             </a:r>
           </a:p>
           <a:p>
@@ -6378,22 +7415,59 @@
           </a:p>
           <a:p>
             <a:r>
-              <a:rPr lang="de-DE" dirty="0" smtClean="0"/>
-              <a:t>C++ / </a:t>
-            </a:r>
-            <a:r>
-              <a:rPr lang="de-DE" dirty="0" err="1" smtClean="0"/>
-              <a:t>Micropython</a:t>
+              <a:rPr lang="de-DE" dirty="0" err="1" smtClean="0"/>
+              <a:t>Decent</a:t>
+            </a:r>
+            <a:r>
+              <a:rPr lang="de-DE" dirty="0" smtClean="0"/>
+              <a:t> </a:t>
+            </a:r>
+            <a:r>
+              <a:rPr lang="de-DE" dirty="0" err="1" smtClean="0"/>
+              <a:t>range</a:t>
+            </a:r>
+            <a:endParaRPr lang="de-DE" dirty="0" smtClean="0"/>
+          </a:p>
+          <a:p>
+            <a:endParaRPr lang="de-DE" dirty="0" smtClean="0"/>
+          </a:p>
+          <a:p>
+            <a:r>
+              <a:rPr lang="de-DE" dirty="0" smtClean="0"/>
+              <a:t>IOT (</a:t>
+            </a:r>
+            <a:r>
+              <a:rPr lang="de-DE" dirty="0" err="1" smtClean="0"/>
+              <a:t>Weather</a:t>
+            </a:r>
+            <a:r>
+              <a:rPr lang="de-DE" dirty="0" smtClean="0"/>
+              <a:t> </a:t>
+            </a:r>
+            <a:r>
+              <a:rPr lang="de-DE" dirty="0" err="1" smtClean="0"/>
+              <a:t>station</a:t>
+            </a:r>
+            <a:r>
+              <a:rPr lang="de-DE" dirty="0" smtClean="0"/>
+              <a:t> / LED </a:t>
+            </a:r>
+            <a:r>
+              <a:rPr lang="de-DE" dirty="0" err="1" smtClean="0"/>
+              <a:t>controlling</a:t>
             </a:r>
             <a:r>
               <a:rPr lang="de-DE" dirty="0" smtClean="0"/>
               <a:t> / </a:t>
             </a:r>
             <a:r>
-              <a:rPr lang="de-DE" dirty="0" err="1" smtClean="0"/>
-              <a:t>At-Commands</a:t>
-            </a:r>
-            <a:endParaRPr lang="de-DE" dirty="0"/>
+              <a:rPr lang="de-DE" dirty="0" smtClean="0"/>
+              <a:t>…)</a:t>
+            </a:r>
+            <a:endParaRPr lang="de-DE" dirty="0" smtClean="0"/>
+          </a:p>
+          <a:p>
+            <a:endParaRPr lang="de-DE" dirty="0" smtClean="0"/>
           </a:p>
         </p:txBody>
       </p:sp>
@@ -6438,8 +7512,8 @@
           <a:lstStyle/>
           <a:p>
             <a:r>
-              <a:rPr lang="de-DE" dirty="0" smtClean="0"/>
-              <a:t>Versions</a:t>
+              <a:rPr lang="de-DE" dirty="0" err="1" smtClean="0"/>
+              <a:t>About</a:t>
             </a:r>
             <a:endParaRPr lang="de-DE" dirty="0"/>
           </a:p>
@@ -6462,6 +7536,231 @@
           <a:p>
             <a:r>
               <a:rPr lang="de-DE" dirty="0" smtClean="0"/>
+              <a:t>SDK </a:t>
+            </a:r>
+            <a:r>
+              <a:rPr lang="de-DE" dirty="0" err="1" smtClean="0"/>
+              <a:t>is</a:t>
+            </a:r>
+            <a:r>
+              <a:rPr lang="de-DE" dirty="0" smtClean="0"/>
+              <a:t> open </a:t>
+            </a:r>
+            <a:r>
+              <a:rPr lang="de-DE" dirty="0" err="1" smtClean="0"/>
+              <a:t>source</a:t>
+            </a:r>
+            <a:endParaRPr lang="de-DE" dirty="0" smtClean="0"/>
+          </a:p>
+          <a:p>
+            <a:endParaRPr lang="de-DE" dirty="0" smtClean="0"/>
+          </a:p>
+          <a:p>
+            <a:r>
+              <a:rPr lang="de-DE" dirty="0" smtClean="0"/>
+              <a:t>Runs on 3.3V </a:t>
+            </a:r>
+            <a:r>
+              <a:rPr lang="de-DE" dirty="0" err="1" smtClean="0"/>
+              <a:t>logic</a:t>
+            </a:r>
+            <a:r>
+              <a:rPr lang="de-DE" dirty="0" smtClean="0"/>
+              <a:t>!</a:t>
+            </a:r>
+          </a:p>
+          <a:p>
+            <a:endParaRPr lang="de-DE" dirty="0" smtClean="0"/>
+          </a:p>
+          <a:p>
+            <a:r>
+              <a:rPr lang="de-DE" dirty="0" smtClean="0"/>
+              <a:t>C</a:t>
+            </a:r>
+            <a:r>
+              <a:rPr lang="de-DE" dirty="0" smtClean="0"/>
+              <a:t>++ / </a:t>
+            </a:r>
+            <a:r>
+              <a:rPr lang="de-DE" dirty="0" err="1" smtClean="0"/>
+              <a:t>Micropython</a:t>
+            </a:r>
+            <a:r>
+              <a:rPr lang="de-DE" dirty="0" smtClean="0"/>
+              <a:t> / </a:t>
+            </a:r>
+            <a:r>
+              <a:rPr lang="de-DE" dirty="0" err="1" smtClean="0"/>
+              <a:t>At-Commands</a:t>
+            </a:r>
+            <a:endParaRPr lang="de-DE" dirty="0" smtClean="0"/>
+          </a:p>
+          <a:p>
+            <a:pPr lvl="1"/>
+            <a:r>
+              <a:rPr lang="de-DE" dirty="0" smtClean="0"/>
+              <a:t>AT: </a:t>
+            </a:r>
+            <a:r>
+              <a:rPr lang="de-DE" dirty="0" err="1" smtClean="0"/>
+              <a:t>Used</a:t>
+            </a:r>
+            <a:r>
+              <a:rPr lang="de-DE" dirty="0" smtClean="0"/>
+              <a:t> </a:t>
+            </a:r>
+            <a:r>
+              <a:rPr lang="de-DE" dirty="0" err="1" smtClean="0"/>
+              <a:t>to</a:t>
+            </a:r>
+            <a:r>
+              <a:rPr lang="de-DE" dirty="0" smtClean="0"/>
+              <a:t> </a:t>
+            </a:r>
+            <a:r>
+              <a:rPr lang="de-DE" dirty="0" err="1" smtClean="0"/>
+              <a:t>configure</a:t>
+            </a:r>
+            <a:r>
+              <a:rPr lang="de-DE" dirty="0" smtClean="0"/>
+              <a:t> </a:t>
+            </a:r>
+            <a:r>
+              <a:rPr lang="de-DE" dirty="0" err="1" smtClean="0"/>
+              <a:t>modems</a:t>
+            </a:r>
+            <a:r>
+              <a:rPr lang="de-DE" dirty="0" smtClean="0"/>
+              <a:t> / </a:t>
+            </a:r>
+            <a:r>
+              <a:rPr lang="de-DE" dirty="0" err="1" smtClean="0"/>
+              <a:t>routers</a:t>
+            </a:r>
+            <a:endParaRPr lang="de-DE" dirty="0" smtClean="0"/>
+          </a:p>
+          <a:p>
+            <a:pPr lvl="1"/>
+            <a:r>
+              <a:rPr lang="de-DE" dirty="0" err="1" smtClean="0"/>
+              <a:t>However</a:t>
+            </a:r>
+            <a:r>
+              <a:rPr lang="de-DE" dirty="0" smtClean="0"/>
+              <a:t> </a:t>
+            </a:r>
+            <a:r>
+              <a:rPr lang="de-DE" dirty="0" err="1" smtClean="0"/>
+              <a:t>you</a:t>
+            </a:r>
+            <a:r>
+              <a:rPr lang="de-DE" dirty="0" smtClean="0"/>
+              <a:t> </a:t>
+            </a:r>
+            <a:r>
+              <a:rPr lang="de-DE" dirty="0" err="1" smtClean="0"/>
+              <a:t>can</a:t>
+            </a:r>
+            <a:r>
+              <a:rPr lang="de-DE" dirty="0" smtClean="0"/>
+              <a:t> also </a:t>
+            </a:r>
+            <a:r>
+              <a:rPr lang="de-DE" dirty="0" err="1" smtClean="0"/>
+              <a:t>configure</a:t>
+            </a:r>
+            <a:r>
+              <a:rPr lang="de-DE" dirty="0" smtClean="0"/>
+              <a:t> </a:t>
+            </a:r>
+            <a:r>
+              <a:rPr lang="de-DE" dirty="0" err="1" smtClean="0"/>
+              <a:t>it</a:t>
+            </a:r>
+            <a:r>
+              <a:rPr lang="de-DE" dirty="0" smtClean="0"/>
+              <a:t> </a:t>
+            </a:r>
+            <a:r>
+              <a:rPr lang="de-DE" dirty="0" err="1" smtClean="0"/>
+              <a:t>using</a:t>
+            </a:r>
+            <a:r>
+              <a:rPr lang="de-DE" dirty="0" smtClean="0"/>
+              <a:t> C++ / Python</a:t>
+            </a:r>
+            <a:endParaRPr lang="de-DE" dirty="0" smtClean="0"/>
+          </a:p>
+          <a:p>
+            <a:endParaRPr lang="de-DE" dirty="0" smtClean="0"/>
+          </a:p>
+        </p:txBody>
+      </p:sp>
+    </p:spTree>
+  </p:cSld>
+  <p:clrMapOvr>
+    <a:masterClrMapping/>
+  </p:clrMapOvr>
+</p:sld>
+</file>
+
+<file path=ppt/slides/slide5.xml><?xml version="1.0" encoding="utf-8"?>
+<p:sld xmlns:a="http://schemas.openxmlformats.org/drawingml/2006/main" xmlns:r="http://schemas.openxmlformats.org/officeDocument/2006/relationships" xmlns:p="http://schemas.openxmlformats.org/presentationml/2006/main">
+  <p:cSld>
+    <p:spTree>
+      <p:nvGrpSpPr>
+        <p:cNvPr id="1" name=""/>
+        <p:cNvGrpSpPr/>
+        <p:nvPr/>
+      </p:nvGrpSpPr>
+      <p:grpSpPr>
+        <a:xfrm>
+          <a:off x="0" y="0"/>
+          <a:ext cx="0" cy="0"/>
+          <a:chOff x="0" y="0"/>
+          <a:chExt cx="0" cy="0"/>
+        </a:xfrm>
+      </p:grpSpPr>
+      <p:sp>
+        <p:nvSpPr>
+          <p:cNvPr id="2" name="Titel 1"/>
+          <p:cNvSpPr>
+            <a:spLocks noGrp="1"/>
+          </p:cNvSpPr>
+          <p:nvPr>
+            <p:ph type="title"/>
+          </p:nvPr>
+        </p:nvSpPr>
+        <p:spPr/>
+        <p:txBody>
+          <a:bodyPr/>
+          <a:lstStyle/>
+          <a:p>
+            <a:r>
+              <a:rPr lang="de-DE" dirty="0" smtClean="0"/>
+              <a:t>Versions</a:t>
+            </a:r>
+            <a:endParaRPr lang="de-DE" dirty="0"/>
+          </a:p>
+        </p:txBody>
+      </p:sp>
+      <p:sp>
+        <p:nvSpPr>
+          <p:cNvPr id="3" name="Inhaltsplatzhalter 2"/>
+          <p:cNvSpPr>
+            <a:spLocks noGrp="1"/>
+          </p:cNvSpPr>
+          <p:nvPr>
+            <p:ph sz="quarter" idx="1"/>
+          </p:nvPr>
+        </p:nvSpPr>
+        <p:spPr/>
+        <p:txBody>
+          <a:bodyPr/>
+          <a:lstStyle/>
+          <a:p>
+            <a:r>
+              <a:rPr lang="de-DE" dirty="0" smtClean="0"/>
               <a:t>ESP Version-01</a:t>
             </a:r>
           </a:p>
@@ -6480,10 +7779,14 @@
             </a:r>
             <a:r>
               <a:rPr lang="de-DE" dirty="0" smtClean="0"/>
-              <a:t> via. USB – Serial - </a:t>
-            </a:r>
-            <a:r>
-              <a:rPr lang="de-DE" smtClean="0"/>
+              <a:t> via. USB – </a:t>
+            </a:r>
+            <a:r>
+              <a:rPr lang="de-DE" dirty="0" smtClean="0"/>
+              <a:t>UART- </a:t>
+            </a:r>
+            <a:r>
+              <a:rPr lang="de-DE" dirty="0" err="1" smtClean="0"/>
               <a:t>Converter</a:t>
             </a:r>
             <a:endParaRPr lang="de-DE" dirty="0" smtClean="0"/>
@@ -6499,7 +7802,804 @@
               <a:rPr lang="de-DE" dirty="0" smtClean="0"/>
               <a:t>ESP-WROOM-02</a:t>
             </a:r>
+          </a:p>
+          <a:p>
+            <a:pPr lvl="1"/>
+            <a:r>
+              <a:rPr lang="de-DE" dirty="0" smtClean="0"/>
+              <a:t>18 Pins</a:t>
+            </a:r>
+          </a:p>
+          <a:p>
+            <a:pPr lvl="1"/>
+            <a:r>
+              <a:rPr lang="de-DE" dirty="0" err="1" smtClean="0"/>
+              <a:t>Existing</a:t>
+            </a:r>
+            <a:r>
+              <a:rPr lang="de-DE" dirty="0" smtClean="0"/>
+              <a:t> USB - </a:t>
+            </a:r>
+            <a:r>
+              <a:rPr lang="de-DE" dirty="0" err="1" smtClean="0"/>
+              <a:t>port</a:t>
+            </a:r>
             <a:endParaRPr lang="de-DE" dirty="0"/>
+          </a:p>
+        </p:txBody>
+      </p:sp>
+      <p:pic>
+        <p:nvPicPr>
+          <p:cNvPr id="4" name="Grafik 3" descr="ESP-01 (1).jpg"/>
+          <p:cNvPicPr>
+            <a:picLocks noChangeAspect="1"/>
+          </p:cNvPicPr>
+          <p:nvPr/>
+        </p:nvPicPr>
+        <p:blipFill>
+          <a:blip r:embed="rId2" cstate="print"/>
+          <a:stretch>
+            <a:fillRect/>
+          </a:stretch>
+        </p:blipFill>
+        <p:spPr>
+          <a:xfrm>
+            <a:off x="6444208" y="1556792"/>
+            <a:ext cx="2201461" cy="1938288"/>
+          </a:xfrm>
+          <a:prstGeom prst="rect">
+            <a:avLst/>
+          </a:prstGeom>
+        </p:spPr>
+      </p:pic>
+    </p:spTree>
+  </p:cSld>
+  <p:clrMapOvr>
+    <a:masterClrMapping/>
+  </p:clrMapOvr>
+</p:sld>
+</file>
+
+<file path=ppt/slides/slide6.xml><?xml version="1.0" encoding="utf-8"?>
+<p:sld xmlns:a="http://schemas.openxmlformats.org/drawingml/2006/main" xmlns:r="http://schemas.openxmlformats.org/officeDocument/2006/relationships" xmlns:p="http://schemas.openxmlformats.org/presentationml/2006/main">
+  <p:cSld>
+    <p:spTree>
+      <p:nvGrpSpPr>
+        <p:cNvPr id="1" name=""/>
+        <p:cNvGrpSpPr/>
+        <p:nvPr/>
+      </p:nvGrpSpPr>
+      <p:grpSpPr>
+        <a:xfrm>
+          <a:off x="0" y="0"/>
+          <a:ext cx="0" cy="0"/>
+          <a:chOff x="0" y="0"/>
+          <a:chExt cx="0" cy="0"/>
+        </a:xfrm>
+      </p:grpSpPr>
+      <p:sp>
+        <p:nvSpPr>
+          <p:cNvPr id="2" name="Titel 1"/>
+          <p:cNvSpPr>
+            <a:spLocks noGrp="1"/>
+          </p:cNvSpPr>
+          <p:nvPr>
+            <p:ph type="title"/>
+          </p:nvPr>
+        </p:nvSpPr>
+        <p:spPr/>
+        <p:txBody>
+          <a:bodyPr/>
+          <a:lstStyle/>
+          <a:p>
+            <a:r>
+              <a:rPr lang="de-DE" dirty="0" smtClean="0"/>
+              <a:t>Versions</a:t>
+            </a:r>
+            <a:endParaRPr lang="de-DE" dirty="0"/>
+          </a:p>
+        </p:txBody>
+      </p:sp>
+      <p:sp>
+        <p:nvSpPr>
+          <p:cNvPr id="3" name="Inhaltsplatzhalter 2"/>
+          <p:cNvSpPr>
+            <a:spLocks noGrp="1"/>
+          </p:cNvSpPr>
+          <p:nvPr>
+            <p:ph sz="quarter" idx="1"/>
+          </p:nvPr>
+        </p:nvSpPr>
+        <p:spPr/>
+        <p:txBody>
+          <a:bodyPr/>
+          <a:lstStyle/>
+          <a:p>
+            <a:r>
+              <a:rPr lang="en-US" dirty="0" smtClean="0"/>
+              <a:t>Big variety of versions, the principle stays the same</a:t>
+            </a:r>
+          </a:p>
+          <a:p>
+            <a:pPr>
+              <a:buNone/>
+            </a:pPr>
+            <a:endParaRPr lang="en-US" dirty="0"/>
+          </a:p>
+        </p:txBody>
+      </p:sp>
+      <p:pic>
+        <p:nvPicPr>
+          <p:cNvPr id="6" name="Grafik 5" descr="esp8266-5.png"/>
+          <p:cNvPicPr>
+            <a:picLocks noChangeAspect="1"/>
+          </p:cNvPicPr>
+          <p:nvPr/>
+        </p:nvPicPr>
+        <p:blipFill>
+          <a:blip r:embed="rId2" cstate="print"/>
+          <a:stretch>
+            <a:fillRect/>
+          </a:stretch>
+        </p:blipFill>
+        <p:spPr>
+          <a:xfrm>
+            <a:off x="4211960" y="2276872"/>
+            <a:ext cx="4588191" cy="1903615"/>
+          </a:xfrm>
+          <a:prstGeom prst="rect">
+            <a:avLst/>
+          </a:prstGeom>
+        </p:spPr>
+      </p:pic>
+      <p:graphicFrame>
+        <p:nvGraphicFramePr>
+          <p:cNvPr id="7" name="Tabelle 6"/>
+          <p:cNvGraphicFramePr>
+            <a:graphicFrameLocks noGrp="1"/>
+          </p:cNvGraphicFramePr>
+          <p:nvPr/>
+        </p:nvGraphicFramePr>
+        <p:xfrm>
+          <a:off x="467544" y="2348880"/>
+          <a:ext cx="3600400" cy="3840480"/>
+        </p:xfrm>
+        <a:graphic>
+          <a:graphicData uri="http://schemas.openxmlformats.org/drawingml/2006/table">
+            <a:tbl>
+              <a:tblPr firstRow="1" bandRow="1">
+                <a:tableStyleId>{5C22544A-7EE6-4342-B048-85BDC9FD1C3A}</a:tableStyleId>
+              </a:tblPr>
+              <a:tblGrid>
+                <a:gridCol w="1080120"/>
+                <a:gridCol w="2520280"/>
+              </a:tblGrid>
+              <a:tr h="328036">
+                <a:tc>
+                  <a:txBody>
+                    <a:bodyPr/>
+                    <a:lstStyle/>
+                    <a:p>
+                      <a:r>
+                        <a:rPr lang="de-DE" dirty="0" smtClean="0"/>
+                        <a:t>ID</a:t>
+                      </a:r>
+                      <a:endParaRPr lang="de-DE" dirty="0"/>
+                    </a:p>
+                  </a:txBody>
+                  <a:tcPr/>
+                </a:tc>
+                <a:tc>
+                  <a:txBody>
+                    <a:bodyPr/>
+                    <a:lstStyle/>
+                    <a:p>
+                      <a:r>
+                        <a:rPr lang="de-DE" dirty="0" err="1" smtClean="0"/>
+                        <a:t>Usage</a:t>
+                      </a:r>
+                      <a:endParaRPr lang="de-DE" dirty="0"/>
+                    </a:p>
+                  </a:txBody>
+                  <a:tcPr/>
+                </a:tc>
+              </a:tr>
+              <a:tr h="328036">
+                <a:tc>
+                  <a:txBody>
+                    <a:bodyPr/>
+                    <a:lstStyle/>
+                    <a:p>
+                      <a:r>
+                        <a:rPr lang="de-DE" dirty="0" smtClean="0"/>
+                        <a:t>RX</a:t>
+                      </a:r>
+                      <a:endParaRPr lang="de-DE" dirty="0"/>
+                    </a:p>
+                  </a:txBody>
+                  <a:tcPr/>
+                </a:tc>
+                <a:tc>
+                  <a:txBody>
+                    <a:bodyPr/>
+                    <a:lstStyle/>
+                    <a:p>
+                      <a:r>
+                        <a:rPr lang="de-DE" dirty="0" smtClean="0"/>
+                        <a:t>Serial Input</a:t>
+                      </a:r>
+                      <a:endParaRPr lang="de-DE" dirty="0"/>
+                    </a:p>
+                  </a:txBody>
+                  <a:tcPr/>
+                </a:tc>
+              </a:tr>
+              <a:tr h="328036">
+                <a:tc>
+                  <a:txBody>
+                    <a:bodyPr/>
+                    <a:lstStyle/>
+                    <a:p>
+                      <a:r>
+                        <a:rPr lang="de-DE" dirty="0" smtClean="0"/>
+                        <a:t>VCC</a:t>
+                      </a:r>
+                      <a:endParaRPr lang="de-DE" dirty="0"/>
+                    </a:p>
+                  </a:txBody>
+                  <a:tcPr/>
+                </a:tc>
+                <a:tc>
+                  <a:txBody>
+                    <a:bodyPr/>
+                    <a:lstStyle/>
+                    <a:p>
+                      <a:r>
+                        <a:rPr lang="de-DE" dirty="0" err="1" smtClean="0"/>
+                        <a:t>Voltage</a:t>
+                      </a:r>
+                      <a:r>
+                        <a:rPr lang="de-DE" baseline="0" dirty="0" smtClean="0"/>
+                        <a:t> </a:t>
+                      </a:r>
+                      <a:r>
+                        <a:rPr lang="de-DE" baseline="0" dirty="0" err="1" smtClean="0"/>
+                        <a:t>Supply</a:t>
+                      </a:r>
+                      <a:endParaRPr lang="de-DE" dirty="0"/>
+                    </a:p>
+                  </a:txBody>
+                  <a:tcPr/>
+                </a:tc>
+              </a:tr>
+              <a:tr h="328036">
+                <a:tc>
+                  <a:txBody>
+                    <a:bodyPr/>
+                    <a:lstStyle/>
+                    <a:p>
+                      <a:r>
+                        <a:rPr lang="de-DE" dirty="0" smtClean="0"/>
+                        <a:t>GPIO 0</a:t>
+                      </a:r>
+                      <a:endParaRPr lang="de-DE" dirty="0"/>
+                    </a:p>
+                  </a:txBody>
+                  <a:tcPr/>
+                </a:tc>
+                <a:tc>
+                  <a:txBody>
+                    <a:bodyPr/>
+                    <a:lstStyle/>
+                    <a:p>
+                      <a:r>
+                        <a:rPr lang="de-DE" dirty="0" smtClean="0"/>
+                        <a:t>HIGH = </a:t>
+                      </a:r>
+                      <a:r>
+                        <a:rPr lang="de-DE" dirty="0" err="1" smtClean="0"/>
+                        <a:t>Flashing</a:t>
+                      </a:r>
+                      <a:endParaRPr lang="de-DE" dirty="0"/>
+                    </a:p>
+                  </a:txBody>
+                  <a:tcPr/>
+                </a:tc>
+              </a:tr>
+              <a:tr h="328036">
+                <a:tc>
+                  <a:txBody>
+                    <a:bodyPr/>
+                    <a:lstStyle/>
+                    <a:p>
+                      <a:r>
+                        <a:rPr lang="de-DE" dirty="0" smtClean="0"/>
+                        <a:t>RESET</a:t>
+                      </a:r>
+                      <a:endParaRPr lang="de-DE" dirty="0"/>
+                    </a:p>
+                  </a:txBody>
+                  <a:tcPr/>
+                </a:tc>
+                <a:tc>
+                  <a:txBody>
+                    <a:bodyPr/>
+                    <a:lstStyle/>
+                    <a:p>
+                      <a:r>
+                        <a:rPr lang="de-DE" dirty="0" smtClean="0"/>
+                        <a:t>LOW = RESET (</a:t>
+                      </a:r>
+                      <a:r>
+                        <a:rPr lang="de-DE" dirty="0" err="1" smtClean="0"/>
+                        <a:t>Pullup</a:t>
+                      </a:r>
+                      <a:r>
+                        <a:rPr lang="de-DE" baseline="0" dirty="0" smtClean="0"/>
+                        <a:t> </a:t>
+                      </a:r>
+                      <a:r>
+                        <a:rPr lang="de-DE" baseline="0" dirty="0" err="1" smtClean="0"/>
+                        <a:t>to</a:t>
+                      </a:r>
+                      <a:r>
+                        <a:rPr lang="de-DE" baseline="0" dirty="0" smtClean="0"/>
+                        <a:t> </a:t>
+                      </a:r>
+                      <a:r>
+                        <a:rPr lang="de-DE" baseline="0" dirty="0" err="1" smtClean="0"/>
+                        <a:t>high</a:t>
+                      </a:r>
+                      <a:r>
+                        <a:rPr lang="de-DE" dirty="0" smtClean="0"/>
+                        <a:t>)</a:t>
+                      </a:r>
+                      <a:endParaRPr lang="de-DE" dirty="0"/>
+                    </a:p>
+                  </a:txBody>
+                  <a:tcPr/>
+                </a:tc>
+              </a:tr>
+              <a:tr h="328036">
+                <a:tc>
+                  <a:txBody>
+                    <a:bodyPr/>
+                    <a:lstStyle/>
+                    <a:p>
+                      <a:r>
+                        <a:rPr lang="de-DE" dirty="0" smtClean="0"/>
+                        <a:t>GPIO 2</a:t>
+                      </a:r>
+                      <a:endParaRPr lang="de-DE" dirty="0"/>
+                    </a:p>
+                  </a:txBody>
+                  <a:tcPr/>
+                </a:tc>
+                <a:tc>
+                  <a:txBody>
+                    <a:bodyPr/>
+                    <a:lstStyle/>
+                    <a:p>
+                      <a:r>
+                        <a:rPr lang="de-DE" dirty="0" smtClean="0"/>
+                        <a:t>HIGH</a:t>
+                      </a:r>
+                      <a:endParaRPr lang="de-DE" dirty="0"/>
+                    </a:p>
+                  </a:txBody>
+                  <a:tcPr/>
+                </a:tc>
+              </a:tr>
+              <a:tr h="328036">
+                <a:tc>
+                  <a:txBody>
+                    <a:bodyPr/>
+                    <a:lstStyle/>
+                    <a:p>
+                      <a:r>
+                        <a:rPr lang="de-DE" dirty="0" smtClean="0"/>
+                        <a:t>CH_PD</a:t>
+                      </a:r>
+                      <a:endParaRPr lang="de-DE" dirty="0"/>
+                    </a:p>
+                  </a:txBody>
+                  <a:tcPr/>
+                </a:tc>
+                <a:tc>
+                  <a:txBody>
+                    <a:bodyPr/>
+                    <a:lstStyle/>
+                    <a:p>
+                      <a:r>
+                        <a:rPr lang="de-DE" dirty="0" smtClean="0"/>
+                        <a:t>LOW</a:t>
+                      </a:r>
+                      <a:r>
+                        <a:rPr lang="de-DE" baseline="0" dirty="0" smtClean="0"/>
+                        <a:t> = Power Down (Chip not </a:t>
+                      </a:r>
+                      <a:r>
+                        <a:rPr lang="de-DE" baseline="0" dirty="0" err="1" smtClean="0"/>
+                        <a:t>running</a:t>
+                      </a:r>
+                      <a:r>
+                        <a:rPr lang="de-DE" baseline="0" dirty="0" smtClean="0"/>
+                        <a:t>)</a:t>
+                      </a:r>
+                      <a:endParaRPr lang="de-DE" dirty="0"/>
+                    </a:p>
+                  </a:txBody>
+                  <a:tcPr/>
+                </a:tc>
+              </a:tr>
+              <a:tr h="328036">
+                <a:tc>
+                  <a:txBody>
+                    <a:bodyPr/>
+                    <a:lstStyle/>
+                    <a:p>
+                      <a:r>
+                        <a:rPr lang="de-DE" dirty="0" smtClean="0"/>
+                        <a:t>GND</a:t>
+                      </a:r>
+                      <a:endParaRPr lang="de-DE" dirty="0"/>
+                    </a:p>
+                  </a:txBody>
+                  <a:tcPr/>
+                </a:tc>
+                <a:tc>
+                  <a:txBody>
+                    <a:bodyPr/>
+                    <a:lstStyle/>
+                    <a:p>
+                      <a:r>
+                        <a:rPr lang="de-DE" dirty="0" err="1" smtClean="0"/>
+                        <a:t>Ground</a:t>
+                      </a:r>
+                      <a:endParaRPr lang="de-DE" dirty="0"/>
+                    </a:p>
+                  </a:txBody>
+                  <a:tcPr/>
+                </a:tc>
+              </a:tr>
+              <a:tr h="328036">
+                <a:tc>
+                  <a:txBody>
+                    <a:bodyPr/>
+                    <a:lstStyle/>
+                    <a:p>
+                      <a:r>
+                        <a:rPr lang="de-DE" dirty="0" smtClean="0"/>
+                        <a:t>TX</a:t>
+                      </a:r>
+                      <a:endParaRPr lang="de-DE" dirty="0"/>
+                    </a:p>
+                  </a:txBody>
+                  <a:tcPr/>
+                </a:tc>
+                <a:tc>
+                  <a:txBody>
+                    <a:bodyPr/>
+                    <a:lstStyle/>
+                    <a:p>
+                      <a:r>
+                        <a:rPr lang="de-DE" dirty="0" smtClean="0"/>
+                        <a:t>Serial Output</a:t>
+                      </a:r>
+                      <a:endParaRPr lang="de-DE" dirty="0"/>
+                    </a:p>
+                  </a:txBody>
+                  <a:tcPr/>
+                </a:tc>
+              </a:tr>
+            </a:tbl>
+          </a:graphicData>
+        </a:graphic>
+      </p:graphicFrame>
+    </p:spTree>
+  </p:cSld>
+  <p:clrMapOvr>
+    <a:masterClrMapping/>
+  </p:clrMapOvr>
+</p:sld>
+</file>
+
+<file path=ppt/slides/slide7.xml><?xml version="1.0" encoding="utf-8"?>
+<p:sld xmlns:a="http://schemas.openxmlformats.org/drawingml/2006/main" xmlns:r="http://schemas.openxmlformats.org/officeDocument/2006/relationships" xmlns:p="http://schemas.openxmlformats.org/presentationml/2006/main">
+  <p:cSld>
+    <p:spTree>
+      <p:nvGrpSpPr>
+        <p:cNvPr id="1" name=""/>
+        <p:cNvGrpSpPr/>
+        <p:nvPr/>
+      </p:nvGrpSpPr>
+      <p:grpSpPr>
+        <a:xfrm>
+          <a:off x="0" y="0"/>
+          <a:ext cx="0" cy="0"/>
+          <a:chOff x="0" y="0"/>
+          <a:chExt cx="0" cy="0"/>
+        </a:xfrm>
+      </p:grpSpPr>
+      <p:sp>
+        <p:nvSpPr>
+          <p:cNvPr id="2" name="Titel 1"/>
+          <p:cNvSpPr>
+            <a:spLocks noGrp="1"/>
+          </p:cNvSpPr>
+          <p:nvPr>
+            <p:ph type="title"/>
+          </p:nvPr>
+        </p:nvSpPr>
+        <p:spPr/>
+        <p:txBody>
+          <a:bodyPr/>
+          <a:lstStyle/>
+          <a:p>
+            <a:r>
+              <a:rPr lang="de-DE" dirty="0" smtClean="0"/>
+              <a:t>Setup - Hardware</a:t>
+            </a:r>
+            <a:endParaRPr lang="de-DE" dirty="0"/>
+          </a:p>
+        </p:txBody>
+      </p:sp>
+      <p:sp>
+        <p:nvSpPr>
+          <p:cNvPr id="3" name="Inhaltsplatzhalter 2"/>
+          <p:cNvSpPr>
+            <a:spLocks noGrp="1"/>
+          </p:cNvSpPr>
+          <p:nvPr>
+            <p:ph sz="quarter" idx="1"/>
+          </p:nvPr>
+        </p:nvSpPr>
+        <p:spPr/>
+        <p:txBody>
+          <a:bodyPr/>
+          <a:lstStyle/>
+          <a:p>
+            <a:r>
+              <a:rPr lang="en-US" dirty="0" smtClean="0"/>
+              <a:t>USB Cable</a:t>
+            </a:r>
+          </a:p>
+          <a:p>
+            <a:r>
+              <a:rPr lang="en-US" dirty="0" smtClean="0"/>
+              <a:t>USB -&gt; UART Converter</a:t>
+            </a:r>
+          </a:p>
+          <a:p>
+            <a:pPr lvl="1"/>
+            <a:r>
+              <a:rPr lang="en-US" dirty="0" smtClean="0"/>
+              <a:t>You can also use an </a:t>
+            </a:r>
+            <a:r>
+              <a:rPr lang="en-US" dirty="0" err="1" smtClean="0"/>
+              <a:t>Arduino</a:t>
+            </a:r>
+            <a:r>
+              <a:rPr lang="en-US" dirty="0" smtClean="0"/>
+              <a:t> -&gt; Bridge RST to GND</a:t>
+            </a:r>
+          </a:p>
+          <a:p>
+            <a:pPr lvl="1"/>
+            <a:endParaRPr lang="en-US" dirty="0" smtClean="0"/>
+          </a:p>
+          <a:p>
+            <a:r>
+              <a:rPr lang="en-US" dirty="0" smtClean="0"/>
+              <a:t>5V to 3.3V Converter</a:t>
+            </a:r>
+          </a:p>
+          <a:p>
+            <a:pPr lvl="1"/>
+            <a:endParaRPr lang="en-US" dirty="0" smtClean="0"/>
+          </a:p>
+          <a:p>
+            <a:r>
+              <a:rPr lang="en-US" dirty="0" smtClean="0"/>
+              <a:t>Breadboard for connecting pins / reset button</a:t>
+            </a:r>
+          </a:p>
+          <a:p>
+            <a:pPr lvl="1"/>
+            <a:r>
+              <a:rPr lang="en-US" dirty="0" smtClean="0"/>
+              <a:t>Connect like shown in the hardware diagram</a:t>
+            </a:r>
+            <a:endParaRPr lang="en-US" dirty="0"/>
+          </a:p>
+        </p:txBody>
+      </p:sp>
+    </p:spTree>
+  </p:cSld>
+  <p:clrMapOvr>
+    <a:masterClrMapping/>
+  </p:clrMapOvr>
+</p:sld>
+</file>
+
+<file path=ppt/slides/slide8.xml><?xml version="1.0" encoding="utf-8"?>
+<p:sld xmlns:a="http://schemas.openxmlformats.org/drawingml/2006/main" xmlns:r="http://schemas.openxmlformats.org/officeDocument/2006/relationships" xmlns:p="http://schemas.openxmlformats.org/presentationml/2006/main">
+  <p:cSld>
+    <p:spTree>
+      <p:nvGrpSpPr>
+        <p:cNvPr id="1" name=""/>
+        <p:cNvGrpSpPr/>
+        <p:nvPr/>
+      </p:nvGrpSpPr>
+      <p:grpSpPr>
+        <a:xfrm>
+          <a:off x="0" y="0"/>
+          <a:ext cx="0" cy="0"/>
+          <a:chOff x="0" y="0"/>
+          <a:chExt cx="0" cy="0"/>
+        </a:xfrm>
+      </p:grpSpPr>
+      <p:sp>
+        <p:nvSpPr>
+          <p:cNvPr id="2" name="Titel 1"/>
+          <p:cNvSpPr>
+            <a:spLocks noGrp="1"/>
+          </p:cNvSpPr>
+          <p:nvPr>
+            <p:ph type="title"/>
+          </p:nvPr>
+        </p:nvSpPr>
+        <p:spPr/>
+        <p:txBody>
+          <a:bodyPr/>
+          <a:lstStyle/>
+          <a:p>
+            <a:r>
+              <a:rPr lang="de-DE" dirty="0" smtClean="0"/>
+              <a:t>Setup - Hardwarediagram</a:t>
+            </a:r>
+            <a:endParaRPr lang="de-DE" dirty="0"/>
+          </a:p>
+        </p:txBody>
+      </p:sp>
+      <p:sp>
+        <p:nvSpPr>
+          <p:cNvPr id="3" name="Inhaltsplatzhalter 2"/>
+          <p:cNvSpPr>
+            <a:spLocks noGrp="1"/>
+          </p:cNvSpPr>
+          <p:nvPr>
+            <p:ph sz="quarter" idx="1"/>
+          </p:nvPr>
+        </p:nvSpPr>
+        <p:spPr/>
+        <p:txBody>
+          <a:bodyPr/>
+          <a:lstStyle/>
+          <a:p>
+            <a:endParaRPr lang="en-US" dirty="0"/>
+          </a:p>
+        </p:txBody>
+      </p:sp>
+    </p:spTree>
+  </p:cSld>
+  <p:clrMapOvr>
+    <a:masterClrMapping/>
+  </p:clrMapOvr>
+</p:sld>
+</file>
+
+<file path=ppt/slides/slide9.xml><?xml version="1.0" encoding="utf-8"?>
+<p:sld xmlns:a="http://schemas.openxmlformats.org/drawingml/2006/main" xmlns:r="http://schemas.openxmlformats.org/officeDocument/2006/relationships" xmlns:p="http://schemas.openxmlformats.org/presentationml/2006/main">
+  <p:cSld>
+    <p:spTree>
+      <p:nvGrpSpPr>
+        <p:cNvPr id="1" name=""/>
+        <p:cNvGrpSpPr/>
+        <p:nvPr/>
+      </p:nvGrpSpPr>
+      <p:grpSpPr>
+        <a:xfrm>
+          <a:off x="0" y="0"/>
+          <a:ext cx="0" cy="0"/>
+          <a:chOff x="0" y="0"/>
+          <a:chExt cx="0" cy="0"/>
+        </a:xfrm>
+      </p:grpSpPr>
+      <p:sp>
+        <p:nvSpPr>
+          <p:cNvPr id="2" name="Titel 1"/>
+          <p:cNvSpPr>
+            <a:spLocks noGrp="1"/>
+          </p:cNvSpPr>
+          <p:nvPr>
+            <p:ph type="title"/>
+          </p:nvPr>
+        </p:nvSpPr>
+        <p:spPr/>
+        <p:txBody>
+          <a:bodyPr/>
+          <a:lstStyle/>
+          <a:p>
+            <a:r>
+              <a:rPr lang="de-DE" dirty="0" smtClean="0"/>
+              <a:t>Setup - Software</a:t>
+            </a:r>
+            <a:endParaRPr lang="de-DE" dirty="0"/>
+          </a:p>
+        </p:txBody>
+      </p:sp>
+      <p:sp>
+        <p:nvSpPr>
+          <p:cNvPr id="3" name="Inhaltsplatzhalter 2"/>
+          <p:cNvSpPr>
+            <a:spLocks noGrp="1"/>
+          </p:cNvSpPr>
+          <p:nvPr>
+            <p:ph sz="quarter" idx="1"/>
+          </p:nvPr>
+        </p:nvSpPr>
+        <p:spPr/>
+        <p:txBody>
+          <a:bodyPr/>
+          <a:lstStyle/>
+          <a:p>
+            <a:r>
+              <a:rPr lang="en-US" dirty="0" smtClean="0"/>
+              <a:t>Many </a:t>
+            </a:r>
+            <a:r>
+              <a:rPr lang="en-US" dirty="0" smtClean="0"/>
+              <a:t>IDEs can be used, in my case </a:t>
+            </a:r>
+            <a:r>
+              <a:rPr lang="en-US" dirty="0" err="1" smtClean="0"/>
+              <a:t>Arduino</a:t>
+            </a:r>
+            <a:r>
+              <a:rPr lang="en-US" dirty="0" smtClean="0"/>
+              <a:t> IDE</a:t>
+            </a:r>
+            <a:endParaRPr lang="en-US" dirty="0" smtClean="0"/>
+          </a:p>
+          <a:p>
+            <a:pPr lvl="1"/>
+            <a:r>
+              <a:rPr lang="en-US" dirty="0" smtClean="0"/>
+              <a:t>Download ESP – Core for </a:t>
+            </a:r>
+            <a:r>
+              <a:rPr lang="en-US" dirty="0" err="1" smtClean="0"/>
+              <a:t>Arduino</a:t>
+            </a:r>
+            <a:r>
+              <a:rPr lang="en-US" dirty="0" smtClean="0"/>
+              <a:t> IDE</a:t>
+            </a:r>
+          </a:p>
+          <a:p>
+            <a:pPr lvl="1"/>
+            <a:endParaRPr lang="en-US" dirty="0" smtClean="0"/>
+          </a:p>
+          <a:p>
+            <a:pPr lvl="1"/>
+            <a:r>
+              <a:rPr lang="en-US" dirty="0" smtClean="0"/>
+              <a:t>Select board from board manager</a:t>
+            </a:r>
+          </a:p>
+          <a:p>
+            <a:pPr lvl="1"/>
+            <a:endParaRPr lang="en-US" dirty="0" smtClean="0"/>
+          </a:p>
+          <a:p>
+            <a:pPr lvl="1"/>
+            <a:r>
+              <a:rPr lang="en-US" dirty="0" smtClean="0"/>
+              <a:t>Upload</a:t>
+            </a:r>
+            <a:endParaRPr lang="en-US" dirty="0"/>
           </a:p>
         </p:txBody>
       </p:sp>

</xml_diff>

<commit_message>
Finished presentation, added examples
</commit_message>
<xml_diff>
--- a/Presentation/Presentation E-Portfolio ES8266.pptx
+++ b/Presentation/Presentation E-Portfolio ES8266.pptx
@@ -18,6 +18,10 @@
     <p:sldId id="266" r:id="rId12"/>
     <p:sldId id="267" r:id="rId13"/>
     <p:sldId id="268" r:id="rId14"/>
+    <p:sldId id="269" r:id="rId15"/>
+    <p:sldId id="270" r:id="rId16"/>
+    <p:sldId id="271" r:id="rId17"/>
+    <p:sldId id="272" r:id="rId18"/>
   </p:sldIdLst>
   <p:sldSz cx="9144000" cy="6858000" type="screen4x3"/>
   <p:notesSz cx="6858000" cy="9144000"/>
@@ -6128,6 +6132,13 @@
   <p:clrMapOvr>
     <a:masterClrMapping/>
   </p:clrMapOvr>
+  <p:timing>
+    <p:tnLst>
+      <p:par>
+        <p:cTn id="1" dur="indefinite" restart="never" nodeType="tmRoot"/>
+      </p:par>
+    </p:tnLst>
+  </p:timing>
 </p:sld>
 </file>
 
@@ -6518,6 +6529,13 @@
   <p:clrMapOvr>
     <a:masterClrMapping/>
   </p:clrMapOvr>
+  <p:timing>
+    <p:tnLst>
+      <p:par>
+        <p:cTn id="1" dur="indefinite" restart="never" nodeType="tmRoot"/>
+      </p:par>
+    </p:tnLst>
+  </p:timing>
 </p:sld>
 </file>
 
@@ -6593,6 +6611,13 @@
   <p:clrMapOvr>
     <a:masterClrMapping/>
   </p:clrMapOvr>
+  <p:timing>
+    <p:tnLst>
+      <p:par>
+        <p:cTn id="1" dur="indefinite" restart="never" nodeType="tmRoot"/>
+      </p:par>
+    </p:tnLst>
+  </p:timing>
 </p:sld>
 </file>
 
@@ -6877,8 +6902,12 @@
           <a:p>
             <a:pPr lvl="1"/>
             <a:r>
-              <a:rPr lang="de-DE" dirty="0" err="1" smtClean="0"/>
-              <a:t>Remember</a:t>
+              <a:rPr lang="de-DE" dirty="0" smtClean="0"/>
+              <a:t>Start </a:t>
+            </a:r>
+            <a:r>
+              <a:rPr lang="de-DE" dirty="0" err="1" smtClean="0"/>
+              <a:t>serial</a:t>
             </a:r>
             <a:r>
               <a:rPr lang="de-DE" dirty="0" smtClean="0"/>
@@ -6886,6 +6915,61 @@
             </a:r>
             <a:r>
               <a:rPr lang="de-DE" dirty="0" err="1" smtClean="0"/>
+              <a:t>communication</a:t>
+            </a:r>
+            <a:r>
+              <a:rPr lang="de-DE" dirty="0" smtClean="0"/>
+              <a:t> </a:t>
+            </a:r>
+            <a:r>
+              <a:rPr lang="de-DE" dirty="0" err="1" smtClean="0"/>
+              <a:t>with</a:t>
+            </a:r>
+            <a:r>
+              <a:rPr lang="de-DE" dirty="0" smtClean="0"/>
+              <a:t> </a:t>
+            </a:r>
+            <a:r>
+              <a:rPr lang="de-DE" dirty="0" err="1" smtClean="0"/>
+              <a:t>the</a:t>
+            </a:r>
+            <a:r>
+              <a:rPr lang="de-DE" dirty="0" smtClean="0"/>
+              <a:t> same </a:t>
+            </a:r>
+            <a:r>
+              <a:rPr lang="de-DE" dirty="0" err="1" smtClean="0"/>
+              <a:t>baud</a:t>
+            </a:r>
+            <a:r>
+              <a:rPr lang="de-DE" dirty="0" smtClean="0"/>
+              <a:t> rate</a:t>
+            </a:r>
+          </a:p>
+          <a:p>
+            <a:pPr lvl="1"/>
+            <a:r>
+              <a:rPr lang="de-DE" dirty="0" smtClean="0"/>
+              <a:t>Set </a:t>
+            </a:r>
+            <a:r>
+              <a:rPr lang="de-DE" dirty="0" err="1" smtClean="0"/>
+              <a:t>baud</a:t>
+            </a:r>
+            <a:r>
+              <a:rPr lang="de-DE" dirty="0" smtClean="0"/>
+              <a:t> rate </a:t>
+            </a:r>
+            <a:r>
+              <a:rPr lang="de-DE" dirty="0" err="1" smtClean="0"/>
+              <a:t>low</a:t>
+            </a:r>
+            <a:r>
+              <a:rPr lang="de-DE" dirty="0" smtClean="0"/>
+              <a:t> </a:t>
+            </a:r>
+            <a:r>
+              <a:rPr lang="de-DE" dirty="0" err="1" smtClean="0"/>
               <a:t>to</a:t>
             </a:r>
             <a:r>
@@ -6894,7 +6978,7 @@
             </a:r>
             <a:r>
               <a:rPr lang="de-DE" dirty="0" err="1" smtClean="0"/>
-              <a:t>set</a:t>
+              <a:t>prevent</a:t>
             </a:r>
             <a:r>
               <a:rPr lang="de-DE" dirty="0" smtClean="0"/>
@@ -6902,20 +6986,29 @@
             </a:r>
             <a:r>
               <a:rPr lang="de-DE" dirty="0" err="1" smtClean="0"/>
-              <a:t>the</a:t>
-            </a:r>
-            <a:r>
-              <a:rPr lang="de-DE" dirty="0" smtClean="0"/>
-              <a:t> same </a:t>
-            </a:r>
-            <a:r>
-              <a:rPr lang="de-DE" dirty="0" err="1" smtClean="0"/>
-              <a:t>baud</a:t>
-            </a:r>
-            <a:r>
-              <a:rPr lang="de-DE" dirty="0" smtClean="0"/>
-              <a:t>-rate</a:t>
-            </a:r>
+              <a:t>serial</a:t>
+            </a:r>
+            <a:r>
+              <a:rPr lang="de-DE" dirty="0" smtClean="0"/>
+              <a:t> </a:t>
+            </a:r>
+            <a:r>
+              <a:rPr lang="de-DE" dirty="0" err="1" smtClean="0"/>
+              <a:t>buffer</a:t>
+            </a:r>
+            <a:r>
+              <a:rPr lang="de-DE" dirty="0" smtClean="0"/>
+              <a:t> </a:t>
+            </a:r>
+            <a:r>
+              <a:rPr lang="de-DE" dirty="0" err="1" smtClean="0"/>
+              <a:t>overflow</a:t>
+            </a:r>
+            <a:r>
+              <a:rPr lang="de-DE" dirty="0" smtClean="0"/>
+              <a:t>!</a:t>
+            </a:r>
+            <a:endParaRPr lang="de-DE" dirty="0" smtClean="0"/>
           </a:p>
         </p:txBody>
       </p:sp>
@@ -6924,6 +7017,13 @@
   <p:clrMapOvr>
     <a:masterClrMapping/>
   </p:clrMapOvr>
+  <p:timing>
+    <p:tnLst>
+      <p:par>
+        <p:cTn id="1" dur="indefinite" restart="never" nodeType="tmRoot"/>
+      </p:par>
+    </p:tnLst>
+  </p:timing>
 </p:sld>
 </file>
 
@@ -7094,6 +7194,722 @@
               <a:rPr lang="de-DE" dirty="0" smtClean="0"/>
               <a:t>.</a:t>
             </a:r>
+          </a:p>
+          <a:p>
+            <a:endParaRPr lang="de-DE" dirty="0" smtClean="0"/>
+          </a:p>
+          <a:p>
+            <a:pPr>
+              <a:buNone/>
+            </a:pPr>
+            <a:endParaRPr lang="de-DE" dirty="0" smtClean="0"/>
+          </a:p>
+        </p:txBody>
+      </p:sp>
+      <p:pic>
+        <p:nvPicPr>
+          <p:cNvPr id="4" name="Grafik 3" descr="FilterCommand.PNG"/>
+          <p:cNvPicPr>
+            <a:picLocks noChangeAspect="1"/>
+          </p:cNvPicPr>
+          <p:nvPr/>
+        </p:nvPicPr>
+        <p:blipFill>
+          <a:blip r:embed="rId2" cstate="print"/>
+          <a:srcRect b="1506"/>
+          <a:stretch>
+            <a:fillRect/>
+          </a:stretch>
+        </p:blipFill>
+        <p:spPr>
+          <a:xfrm>
+            <a:off x="683568" y="2564904"/>
+            <a:ext cx="4706047" cy="2088232"/>
+          </a:xfrm>
+          <a:prstGeom prst="rect">
+            <a:avLst/>
+          </a:prstGeom>
+        </p:spPr>
+      </p:pic>
+    </p:spTree>
+  </p:cSld>
+  <p:clrMapOvr>
+    <a:masterClrMapping/>
+  </p:clrMapOvr>
+</p:sld>
+</file>
+
+<file path=ppt/slides/slide14.xml><?xml version="1.0" encoding="utf-8"?>
+<p:sld xmlns:a="http://schemas.openxmlformats.org/drawingml/2006/main" xmlns:r="http://schemas.openxmlformats.org/officeDocument/2006/relationships" xmlns:p="http://schemas.openxmlformats.org/presentationml/2006/main">
+  <p:cSld>
+    <p:spTree>
+      <p:nvGrpSpPr>
+        <p:cNvPr id="1" name=""/>
+        <p:cNvGrpSpPr/>
+        <p:nvPr/>
+      </p:nvGrpSpPr>
+      <p:grpSpPr>
+        <a:xfrm>
+          <a:off x="0" y="0"/>
+          <a:ext cx="0" cy="0"/>
+          <a:chOff x="0" y="0"/>
+          <a:chExt cx="0" cy="0"/>
+        </a:xfrm>
+      </p:grpSpPr>
+      <p:sp>
+        <p:nvSpPr>
+          <p:cNvPr id="2" name="Titel 1"/>
+          <p:cNvSpPr>
+            <a:spLocks noGrp="1"/>
+          </p:cNvSpPr>
+          <p:nvPr>
+            <p:ph type="title"/>
+          </p:nvPr>
+        </p:nvSpPr>
+        <p:spPr/>
+        <p:txBody>
+          <a:bodyPr/>
+          <a:lstStyle/>
+          <a:p>
+            <a:r>
+              <a:rPr lang="de-DE" dirty="0" err="1" smtClean="0"/>
+              <a:t>Examples</a:t>
+            </a:r>
+            <a:r>
+              <a:rPr lang="de-DE" dirty="0" smtClean="0"/>
+              <a:t> - Webclient</a:t>
+            </a:r>
+            <a:endParaRPr lang="de-DE" dirty="0"/>
+          </a:p>
+        </p:txBody>
+      </p:sp>
+      <p:sp>
+        <p:nvSpPr>
+          <p:cNvPr id="5" name="Inhaltsplatzhalter 4"/>
+          <p:cNvSpPr>
+            <a:spLocks noGrp="1"/>
+          </p:cNvSpPr>
+          <p:nvPr>
+            <p:ph sz="quarter" idx="1"/>
+          </p:nvPr>
+        </p:nvSpPr>
+        <p:spPr/>
+        <p:txBody>
+          <a:bodyPr/>
+          <a:lstStyle/>
+          <a:p>
+            <a:r>
+              <a:rPr lang="de-DE" dirty="0" err="1" smtClean="0"/>
+              <a:t>Connects</a:t>
+            </a:r>
+            <a:r>
+              <a:rPr lang="de-DE" dirty="0" smtClean="0"/>
+              <a:t> </a:t>
+            </a:r>
+            <a:r>
+              <a:rPr lang="de-DE" dirty="0" err="1" smtClean="0"/>
+              <a:t>to</a:t>
+            </a:r>
+            <a:r>
+              <a:rPr lang="de-DE" dirty="0" smtClean="0"/>
+              <a:t> </a:t>
+            </a:r>
+            <a:r>
+              <a:rPr lang="de-DE" dirty="0" err="1" smtClean="0"/>
+              <a:t>WiFi</a:t>
+            </a:r>
+            <a:r>
+              <a:rPr lang="de-DE" dirty="0" smtClean="0"/>
+              <a:t> </a:t>
+            </a:r>
+            <a:r>
+              <a:rPr lang="de-DE" dirty="0" err="1" smtClean="0"/>
+              <a:t>network</a:t>
+            </a:r>
+            <a:endParaRPr lang="de-DE" dirty="0" smtClean="0"/>
+          </a:p>
+          <a:p>
+            <a:endParaRPr lang="de-DE" dirty="0" smtClean="0"/>
+          </a:p>
+          <a:p>
+            <a:r>
+              <a:rPr lang="de-DE" dirty="0" err="1" smtClean="0"/>
+              <a:t>Creates</a:t>
+            </a:r>
+            <a:r>
+              <a:rPr lang="de-DE" dirty="0" smtClean="0"/>
+              <a:t> </a:t>
+            </a:r>
+            <a:r>
+              <a:rPr lang="de-DE" dirty="0" err="1" smtClean="0"/>
+              <a:t>get-request</a:t>
+            </a:r>
+            <a:r>
+              <a:rPr lang="de-DE" dirty="0" smtClean="0"/>
+              <a:t> </a:t>
+            </a:r>
+            <a:r>
+              <a:rPr lang="de-DE" dirty="0" err="1" smtClean="0"/>
+              <a:t>to</a:t>
+            </a:r>
+            <a:r>
+              <a:rPr lang="de-DE" dirty="0" smtClean="0"/>
+              <a:t> api.openwathermap.org</a:t>
+            </a:r>
+          </a:p>
+          <a:p>
+            <a:endParaRPr lang="de-DE" dirty="0" smtClean="0"/>
+          </a:p>
+          <a:p>
+            <a:r>
+              <a:rPr lang="de-DE" dirty="0" smtClean="0"/>
+              <a:t>Displays </a:t>
+            </a:r>
+            <a:r>
+              <a:rPr lang="de-DE" dirty="0" err="1" smtClean="0"/>
+              <a:t>response</a:t>
+            </a:r>
+            <a:endParaRPr lang="de-DE" dirty="0" smtClean="0"/>
+          </a:p>
+        </p:txBody>
+      </p:sp>
+    </p:spTree>
+  </p:cSld>
+  <p:clrMapOvr>
+    <a:masterClrMapping/>
+  </p:clrMapOvr>
+</p:sld>
+</file>
+
+<file path=ppt/slides/slide15.xml><?xml version="1.0" encoding="utf-8"?>
+<p:sld xmlns:a="http://schemas.openxmlformats.org/drawingml/2006/main" xmlns:r="http://schemas.openxmlformats.org/officeDocument/2006/relationships" xmlns:p="http://schemas.openxmlformats.org/presentationml/2006/main">
+  <p:cSld>
+    <p:spTree>
+      <p:nvGrpSpPr>
+        <p:cNvPr id="1" name=""/>
+        <p:cNvGrpSpPr/>
+        <p:nvPr/>
+      </p:nvGrpSpPr>
+      <p:grpSpPr>
+        <a:xfrm>
+          <a:off x="0" y="0"/>
+          <a:ext cx="0" cy="0"/>
+          <a:chOff x="0" y="0"/>
+          <a:chExt cx="0" cy="0"/>
+        </a:xfrm>
+      </p:grpSpPr>
+      <p:sp>
+        <p:nvSpPr>
+          <p:cNvPr id="2" name="Titel 1"/>
+          <p:cNvSpPr>
+            <a:spLocks noGrp="1"/>
+          </p:cNvSpPr>
+          <p:nvPr>
+            <p:ph type="title"/>
+          </p:nvPr>
+        </p:nvSpPr>
+        <p:spPr/>
+        <p:txBody>
+          <a:bodyPr/>
+          <a:lstStyle/>
+          <a:p>
+            <a:r>
+              <a:rPr lang="de-DE" dirty="0" err="1" smtClean="0"/>
+              <a:t>Examples</a:t>
+            </a:r>
+            <a:r>
+              <a:rPr lang="de-DE" dirty="0" smtClean="0"/>
+              <a:t> - Webserver</a:t>
+            </a:r>
+            <a:endParaRPr lang="de-DE" dirty="0"/>
+          </a:p>
+        </p:txBody>
+      </p:sp>
+      <p:sp>
+        <p:nvSpPr>
+          <p:cNvPr id="5" name="Inhaltsplatzhalter 4"/>
+          <p:cNvSpPr>
+            <a:spLocks noGrp="1"/>
+          </p:cNvSpPr>
+          <p:nvPr>
+            <p:ph sz="quarter" idx="1"/>
+          </p:nvPr>
+        </p:nvSpPr>
+        <p:spPr/>
+        <p:txBody>
+          <a:bodyPr/>
+          <a:lstStyle/>
+          <a:p>
+            <a:r>
+              <a:rPr lang="de-DE" dirty="0" err="1" smtClean="0"/>
+              <a:t>Connects</a:t>
+            </a:r>
+            <a:r>
+              <a:rPr lang="de-DE" dirty="0" smtClean="0"/>
+              <a:t> </a:t>
+            </a:r>
+            <a:r>
+              <a:rPr lang="de-DE" dirty="0" err="1" smtClean="0"/>
+              <a:t>to</a:t>
+            </a:r>
+            <a:r>
+              <a:rPr lang="de-DE" dirty="0" smtClean="0"/>
+              <a:t> </a:t>
+            </a:r>
+            <a:r>
+              <a:rPr lang="de-DE" dirty="0" err="1" smtClean="0"/>
+              <a:t>WiFi</a:t>
+            </a:r>
+            <a:r>
+              <a:rPr lang="de-DE" dirty="0" smtClean="0"/>
+              <a:t> </a:t>
+            </a:r>
+            <a:r>
+              <a:rPr lang="de-DE" dirty="0" err="1" smtClean="0"/>
+              <a:t>network</a:t>
+            </a:r>
+            <a:endParaRPr lang="de-DE" dirty="0" smtClean="0"/>
+          </a:p>
+          <a:p>
+            <a:endParaRPr lang="de-DE" dirty="0" smtClean="0"/>
+          </a:p>
+          <a:p>
+            <a:r>
+              <a:rPr lang="de-DE" dirty="0" err="1" smtClean="0"/>
+              <a:t>Creates</a:t>
+            </a:r>
+            <a:r>
+              <a:rPr lang="de-DE" dirty="0" smtClean="0"/>
+              <a:t> a </a:t>
+            </a:r>
+            <a:r>
+              <a:rPr lang="de-DE" dirty="0" err="1" smtClean="0"/>
+              <a:t>response</a:t>
+            </a:r>
+            <a:r>
+              <a:rPr lang="de-DE" dirty="0" smtClean="0"/>
+              <a:t> </a:t>
+            </a:r>
+            <a:r>
+              <a:rPr lang="de-DE" dirty="0" err="1" smtClean="0"/>
+              <a:t>site</a:t>
+            </a:r>
+            <a:r>
+              <a:rPr lang="de-DE" dirty="0" smtClean="0"/>
+              <a:t> </a:t>
+            </a:r>
+            <a:r>
+              <a:rPr lang="de-DE" dirty="0" err="1" smtClean="0"/>
+              <a:t>for</a:t>
+            </a:r>
+            <a:r>
+              <a:rPr lang="de-DE" dirty="0" smtClean="0"/>
+              <a:t> a </a:t>
+            </a:r>
+            <a:r>
+              <a:rPr lang="de-DE" dirty="0" err="1" smtClean="0"/>
+              <a:t>get</a:t>
+            </a:r>
+            <a:r>
+              <a:rPr lang="de-DE" dirty="0" smtClean="0"/>
+              <a:t> </a:t>
+            </a:r>
+            <a:r>
+              <a:rPr lang="de-DE" dirty="0" err="1" smtClean="0"/>
+              <a:t>request</a:t>
+            </a:r>
+            <a:r>
+              <a:rPr lang="de-DE" dirty="0" smtClean="0"/>
+              <a:t> /</a:t>
+            </a:r>
+            <a:r>
+              <a:rPr lang="de-DE" dirty="0" err="1" smtClean="0"/>
+              <a:t>hello</a:t>
+            </a:r>
+            <a:endParaRPr lang="de-DE" dirty="0" smtClean="0"/>
+          </a:p>
+        </p:txBody>
+      </p:sp>
+    </p:spTree>
+  </p:cSld>
+  <p:clrMapOvr>
+    <a:masterClrMapping/>
+  </p:clrMapOvr>
+</p:sld>
+</file>
+
+<file path=ppt/slides/slide16.xml><?xml version="1.0" encoding="utf-8"?>
+<p:sld xmlns:a="http://schemas.openxmlformats.org/drawingml/2006/main" xmlns:r="http://schemas.openxmlformats.org/officeDocument/2006/relationships" xmlns:p="http://schemas.openxmlformats.org/presentationml/2006/main">
+  <p:cSld>
+    <p:spTree>
+      <p:nvGrpSpPr>
+        <p:cNvPr id="1" name=""/>
+        <p:cNvGrpSpPr/>
+        <p:nvPr/>
+      </p:nvGrpSpPr>
+      <p:grpSpPr>
+        <a:xfrm>
+          <a:off x="0" y="0"/>
+          <a:ext cx="0" cy="0"/>
+          <a:chOff x="0" y="0"/>
+          <a:chExt cx="0" cy="0"/>
+        </a:xfrm>
+      </p:grpSpPr>
+      <p:sp>
+        <p:nvSpPr>
+          <p:cNvPr id="2" name="Titel 1"/>
+          <p:cNvSpPr>
+            <a:spLocks noGrp="1"/>
+          </p:cNvSpPr>
+          <p:nvPr>
+            <p:ph type="title"/>
+          </p:nvPr>
+        </p:nvSpPr>
+        <p:spPr/>
+        <p:txBody>
+          <a:bodyPr/>
+          <a:lstStyle/>
+          <a:p>
+            <a:r>
+              <a:rPr lang="de-DE" dirty="0" err="1" smtClean="0"/>
+              <a:t>Coding</a:t>
+            </a:r>
+            <a:endParaRPr lang="de-DE" dirty="0"/>
+          </a:p>
+        </p:txBody>
+      </p:sp>
+      <p:sp>
+        <p:nvSpPr>
+          <p:cNvPr id="5" name="Inhaltsplatzhalter 4"/>
+          <p:cNvSpPr>
+            <a:spLocks noGrp="1"/>
+          </p:cNvSpPr>
+          <p:nvPr>
+            <p:ph sz="quarter" idx="1"/>
+          </p:nvPr>
+        </p:nvSpPr>
+        <p:spPr/>
+        <p:txBody>
+          <a:bodyPr/>
+          <a:lstStyle/>
+          <a:p>
+            <a:r>
+              <a:rPr lang="de-DE" dirty="0" err="1" smtClean="0"/>
+              <a:t>Weather</a:t>
+            </a:r>
+            <a:r>
+              <a:rPr lang="de-DE" dirty="0" smtClean="0"/>
+              <a:t> </a:t>
+            </a:r>
+            <a:r>
+              <a:rPr lang="de-DE" dirty="0" err="1" smtClean="0"/>
+              <a:t>station</a:t>
+            </a:r>
+            <a:endParaRPr lang="de-DE" dirty="0" smtClean="0"/>
+          </a:p>
+          <a:p>
+            <a:endParaRPr lang="de-DE" dirty="0" smtClean="0"/>
+          </a:p>
+          <a:p>
+            <a:r>
+              <a:rPr lang="de-DE" dirty="0" err="1" smtClean="0"/>
+              <a:t>Gets</a:t>
+            </a:r>
+            <a:r>
+              <a:rPr lang="de-DE" dirty="0" smtClean="0"/>
+              <a:t> </a:t>
+            </a:r>
+            <a:r>
+              <a:rPr lang="de-DE" dirty="0" err="1" smtClean="0"/>
+              <a:t>current</a:t>
+            </a:r>
+            <a:r>
+              <a:rPr lang="de-DE" dirty="0" smtClean="0"/>
+              <a:t> </a:t>
+            </a:r>
+            <a:r>
+              <a:rPr lang="de-DE" dirty="0" err="1" smtClean="0"/>
+              <a:t>weather</a:t>
+            </a:r>
+            <a:r>
+              <a:rPr lang="de-DE" dirty="0" smtClean="0"/>
+              <a:t> </a:t>
+            </a:r>
+            <a:r>
+              <a:rPr lang="de-DE" dirty="0" err="1" smtClean="0"/>
+              <a:t>from</a:t>
+            </a:r>
+            <a:r>
+              <a:rPr lang="de-DE" dirty="0" smtClean="0"/>
+              <a:t> an API</a:t>
+            </a:r>
+          </a:p>
+          <a:p>
+            <a:endParaRPr lang="de-DE" dirty="0" smtClean="0"/>
+          </a:p>
+          <a:p>
+            <a:r>
+              <a:rPr lang="de-DE" dirty="0" smtClean="0"/>
+              <a:t>Sends JSON </a:t>
+            </a:r>
+            <a:r>
+              <a:rPr lang="de-DE" dirty="0" err="1" smtClean="0"/>
+              <a:t>to</a:t>
+            </a:r>
+            <a:r>
+              <a:rPr lang="de-DE" dirty="0" smtClean="0"/>
+              <a:t> an </a:t>
+            </a:r>
+            <a:r>
+              <a:rPr lang="de-DE" dirty="0" err="1" smtClean="0"/>
+              <a:t>arduino</a:t>
+            </a:r>
+            <a:endParaRPr lang="de-DE" dirty="0" smtClean="0"/>
+          </a:p>
+          <a:p>
+            <a:endParaRPr lang="de-DE" dirty="0" smtClean="0"/>
+          </a:p>
+          <a:p>
+            <a:r>
+              <a:rPr lang="de-DE" dirty="0" err="1" smtClean="0"/>
+              <a:t>Arduino</a:t>
+            </a:r>
+            <a:r>
+              <a:rPr lang="de-DE" dirty="0" smtClean="0"/>
+              <a:t> </a:t>
+            </a:r>
+            <a:r>
+              <a:rPr lang="de-DE" dirty="0" err="1" smtClean="0"/>
+              <a:t>displays</a:t>
+            </a:r>
+            <a:r>
+              <a:rPr lang="de-DE" dirty="0" smtClean="0"/>
+              <a:t> </a:t>
+            </a:r>
+            <a:r>
+              <a:rPr lang="de-DE" dirty="0" err="1" smtClean="0"/>
+              <a:t>it</a:t>
+            </a:r>
+            <a:r>
+              <a:rPr lang="de-DE" dirty="0" smtClean="0"/>
+              <a:t> on an LCD</a:t>
+            </a:r>
+          </a:p>
+          <a:p>
+            <a:endParaRPr lang="de-DE" dirty="0" smtClean="0"/>
+          </a:p>
+          <a:p>
+            <a:endParaRPr lang="de-DE" dirty="0" smtClean="0"/>
+          </a:p>
+        </p:txBody>
+      </p:sp>
+    </p:spTree>
+  </p:cSld>
+  <p:clrMapOvr>
+    <a:masterClrMapping/>
+  </p:clrMapOvr>
+</p:sld>
+</file>
+
+<file path=ppt/slides/slide17.xml><?xml version="1.0" encoding="utf-8"?>
+<p:sld xmlns:a="http://schemas.openxmlformats.org/drawingml/2006/main" xmlns:r="http://schemas.openxmlformats.org/officeDocument/2006/relationships" xmlns:p="http://schemas.openxmlformats.org/presentationml/2006/main">
+  <p:cSld>
+    <p:spTree>
+      <p:nvGrpSpPr>
+        <p:cNvPr id="1" name=""/>
+        <p:cNvGrpSpPr/>
+        <p:nvPr/>
+      </p:nvGrpSpPr>
+      <p:grpSpPr>
+        <a:xfrm>
+          <a:off x="0" y="0"/>
+          <a:ext cx="0" cy="0"/>
+          <a:chOff x="0" y="0"/>
+          <a:chExt cx="0" cy="0"/>
+        </a:xfrm>
+      </p:grpSpPr>
+      <p:sp>
+        <p:nvSpPr>
+          <p:cNvPr id="2" name="Titel 1"/>
+          <p:cNvSpPr>
+            <a:spLocks noGrp="1"/>
+          </p:cNvSpPr>
+          <p:nvPr>
+            <p:ph type="title"/>
+          </p:nvPr>
+        </p:nvSpPr>
+        <p:spPr/>
+        <p:txBody>
+          <a:bodyPr/>
+          <a:lstStyle/>
+          <a:p>
+            <a:r>
+              <a:rPr lang="de-DE" dirty="0" err="1" smtClean="0"/>
+              <a:t>Sources</a:t>
+            </a:r>
+            <a:endParaRPr lang="de-DE" dirty="0"/>
+          </a:p>
+        </p:txBody>
+      </p:sp>
+      <p:sp>
+        <p:nvSpPr>
+          <p:cNvPr id="3" name="Inhaltsplatzhalter 2"/>
+          <p:cNvSpPr>
+            <a:spLocks noGrp="1"/>
+          </p:cNvSpPr>
+          <p:nvPr>
+            <p:ph sz="quarter" idx="1"/>
+          </p:nvPr>
+        </p:nvSpPr>
+        <p:spPr/>
+        <p:txBody>
+          <a:bodyPr>
+            <a:normAutofit fontScale="77500" lnSpcReduction="20000"/>
+          </a:bodyPr>
+          <a:lstStyle/>
+          <a:p>
+            <a:r>
+              <a:rPr lang="de-DE" dirty="0" smtClean="0">
+                <a:hlinkClick r:id="rId2"/>
+              </a:rPr>
+              <a:t>https://</a:t>
+            </a:r>
+            <a:r>
+              <a:rPr lang="de-DE" dirty="0" smtClean="0">
+                <a:hlinkClick r:id="rId2"/>
+              </a:rPr>
+              <a:t>create.arduino.cc/projecthub/ROBINTHOMAS/esp8266-esp-01-webserver-7248ca?ref=tag&amp;ref_id=esp8266&amp;offset=1</a:t>
+            </a:r>
+            <a:endParaRPr lang="de-DE" dirty="0" smtClean="0"/>
+          </a:p>
+          <a:p>
+            <a:r>
+              <a:rPr lang="de-DE" dirty="0" smtClean="0">
+                <a:hlinkClick r:id="rId3"/>
+              </a:rPr>
+              <a:t>https://</a:t>
+            </a:r>
+            <a:r>
+              <a:rPr lang="de-DE" dirty="0" smtClean="0">
+                <a:hlinkClick r:id="rId3"/>
+              </a:rPr>
+              <a:t>forum.arduino.cc/index.php?topic=462829.0</a:t>
+            </a:r>
+            <a:endParaRPr lang="de-DE" dirty="0" smtClean="0"/>
+          </a:p>
+          <a:p>
+            <a:r>
+              <a:rPr lang="de-DE" dirty="0" smtClean="0">
+                <a:hlinkClick r:id="rId4"/>
+              </a:rPr>
+              <a:t>http://www.whatimade.today/esp8266-easiest-way-to-program-so-far</a:t>
+            </a:r>
+            <a:r>
+              <a:rPr lang="de-DE" dirty="0" smtClean="0">
+                <a:hlinkClick r:id="rId4"/>
+              </a:rPr>
+              <a:t>/</a:t>
+            </a:r>
+            <a:endParaRPr lang="de-DE" dirty="0" smtClean="0"/>
+          </a:p>
+          <a:p>
+            <a:r>
+              <a:rPr lang="de-DE" dirty="0" smtClean="0">
+                <a:hlinkClick r:id="rId5"/>
+              </a:rPr>
+              <a:t>https://</a:t>
+            </a:r>
+            <a:r>
+              <a:rPr lang="de-DE" dirty="0" smtClean="0">
+                <a:hlinkClick r:id="rId5"/>
+              </a:rPr>
+              <a:t>de.wikipedia.org/wiki/AT-Befehlssatz</a:t>
+            </a:r>
+            <a:endParaRPr lang="de-DE" dirty="0" smtClean="0"/>
+          </a:p>
+          <a:p>
+            <a:r>
+              <a:rPr lang="de-DE" dirty="0" smtClean="0">
+                <a:hlinkClick r:id="rId6"/>
+              </a:rPr>
+              <a:t>https://</a:t>
+            </a:r>
+            <a:r>
+              <a:rPr lang="de-DE" dirty="0" smtClean="0">
+                <a:hlinkClick r:id="rId6"/>
+              </a:rPr>
+              <a:t>en.wikipedia.org/wiki/ESP8266</a:t>
+            </a:r>
+            <a:endParaRPr lang="de-DE" dirty="0" smtClean="0"/>
+          </a:p>
+          <a:p>
+            <a:r>
+              <a:rPr lang="de-DE" dirty="0" smtClean="0">
+                <a:hlinkClick r:id="rId7"/>
+              </a:rPr>
+              <a:t>https://</a:t>
+            </a:r>
+            <a:r>
+              <a:rPr lang="de-DE" dirty="0" smtClean="0">
+                <a:hlinkClick r:id="rId7"/>
+              </a:rPr>
+              <a:t>www.espressif.com/en/products/hardware/esp32/overview</a:t>
+            </a:r>
+            <a:endParaRPr lang="de-DE" dirty="0" smtClean="0"/>
+          </a:p>
+          <a:p>
+            <a:r>
+              <a:rPr lang="de-DE" dirty="0" smtClean="0">
+                <a:hlinkClick r:id="rId8"/>
+              </a:rPr>
+              <a:t>http://stefanfrings.de/esp8266</a:t>
+            </a:r>
+            <a:r>
+              <a:rPr lang="de-DE" dirty="0" smtClean="0">
+                <a:hlinkClick r:id="rId8"/>
+              </a:rPr>
+              <a:t>/</a:t>
+            </a:r>
+            <a:endParaRPr lang="de-DE" dirty="0" smtClean="0"/>
+          </a:p>
+          <a:p>
+            <a:endParaRPr lang="de-DE" dirty="0" smtClean="0"/>
+          </a:p>
+          <a:p>
+            <a:r>
+              <a:rPr lang="de-DE" dirty="0" smtClean="0"/>
+              <a:t>Images:</a:t>
+            </a:r>
+          </a:p>
+          <a:p>
+            <a:r>
+              <a:rPr lang="de-DE" dirty="0" smtClean="0">
+                <a:hlinkClick r:id="rId9"/>
+              </a:rPr>
+              <a:t>http://</a:t>
+            </a:r>
+            <a:r>
+              <a:rPr lang="de-DE" dirty="0" smtClean="0">
+                <a:hlinkClick r:id="rId9"/>
+              </a:rPr>
+              <a:t>stefanfrings.de/esp8266/ESP-01.jpg</a:t>
+            </a:r>
+            <a:endParaRPr lang="de-DE" dirty="0" smtClean="0"/>
+          </a:p>
+          <a:p>
+            <a:r>
+              <a:rPr lang="de-DE" dirty="0" smtClean="0">
+                <a:hlinkClick r:id="rId10"/>
+              </a:rPr>
+              <a:t>https://</a:t>
+            </a:r>
+            <a:r>
+              <a:rPr lang="de-DE" dirty="0" smtClean="0">
+                <a:hlinkClick r:id="rId10"/>
+              </a:rPr>
+              <a:t>pradeepsinghblog.files.wordpress.com/2016/04/esp8266-5.png?w=470&amp;h=195</a:t>
+            </a:r>
+            <a:endParaRPr lang="de-DE" dirty="0" smtClean="0"/>
           </a:p>
         </p:txBody>
       </p:sp>
@@ -7186,11 +8002,7 @@
           <a:p>
             <a:r>
               <a:rPr lang="de-DE" dirty="0" smtClean="0"/>
-              <a:t>Setup </a:t>
-            </a:r>
-            <a:r>
-              <a:rPr lang="de-DE" dirty="0" smtClean="0"/>
-              <a:t>/ Programming</a:t>
+              <a:t>Setup / Programming</a:t>
             </a:r>
           </a:p>
           <a:p>
@@ -7239,6 +8051,13 @@
   <p:clrMapOvr>
     <a:masterClrMapping/>
   </p:clrMapOvr>
+  <p:timing>
+    <p:tnLst>
+      <p:par>
+        <p:cTn id="1" dur="indefinite" restart="never" nodeType="tmRoot"/>
+      </p:par>
+    </p:tnLst>
+  </p:timing>
 </p:sld>
 </file>
 
@@ -7403,11 +8222,7 @@
             </a:r>
             <a:r>
               <a:rPr lang="de-DE" dirty="0" smtClean="0"/>
-              <a:t> (~3€</a:t>
-            </a:r>
-            <a:r>
-              <a:rPr lang="de-DE" dirty="0" smtClean="0"/>
-              <a:t>)</a:t>
+              <a:t> (~3€)</a:t>
             </a:r>
           </a:p>
           <a:p>
@@ -7458,13 +8273,8 @@
             </a:r>
             <a:r>
               <a:rPr lang="de-DE" dirty="0" smtClean="0"/>
-              <a:t> / </a:t>
-            </a:r>
-            <a:r>
-              <a:rPr lang="de-DE" dirty="0" smtClean="0"/>
-              <a:t>…)</a:t>
-            </a:r>
-            <a:endParaRPr lang="de-DE" dirty="0" smtClean="0"/>
+              <a:t> / …)</a:t>
+            </a:r>
           </a:p>
           <a:p>
             <a:endParaRPr lang="de-DE" dirty="0" smtClean="0"/>
@@ -7476,6 +8286,13 @@
   <p:clrMapOvr>
     <a:masterClrMapping/>
   </p:clrMapOvr>
+  <p:timing>
+    <p:tnLst>
+      <p:par>
+        <p:cTn id="1" dur="indefinite" restart="never" nodeType="tmRoot"/>
+      </p:par>
+    </p:tnLst>
+  </p:timing>
 </p:sld>
 </file>
 
@@ -7575,11 +8392,7 @@
           <a:p>
             <a:r>
               <a:rPr lang="de-DE" dirty="0" smtClean="0"/>
-              <a:t>C</a:t>
-            </a:r>
-            <a:r>
-              <a:rPr lang="de-DE" dirty="0" smtClean="0"/>
-              <a:t>++ / </a:t>
+              <a:t>C++ / </a:t>
             </a:r>
             <a:r>
               <a:rPr lang="de-DE" dirty="0" err="1" smtClean="0"/>
@@ -7689,7 +8502,6 @@
               <a:rPr lang="de-DE" dirty="0" smtClean="0"/>
               <a:t> C++ / Python</a:t>
             </a:r>
-            <a:endParaRPr lang="de-DE" dirty="0" smtClean="0"/>
           </a:p>
           <a:p>
             <a:endParaRPr lang="de-DE" dirty="0" smtClean="0"/>
@@ -7701,6 +8513,13 @@
   <p:clrMapOvr>
     <a:masterClrMapping/>
   </p:clrMapOvr>
+  <p:timing>
+    <p:tnLst>
+      <p:par>
+        <p:cTn id="1" dur="indefinite" restart="never" nodeType="tmRoot"/>
+      </p:par>
+    </p:tnLst>
+  </p:timing>
 </p:sld>
 </file>
 
@@ -7779,11 +8598,7 @@
             </a:r>
             <a:r>
               <a:rPr lang="de-DE" dirty="0" smtClean="0"/>
-              <a:t> via. USB – </a:t>
-            </a:r>
-            <a:r>
-              <a:rPr lang="de-DE" dirty="0" smtClean="0"/>
-              <a:t>UART- </a:t>
+              <a:t> via. USB – UART- </a:t>
             </a:r>
             <a:r>
               <a:rPr lang="de-DE" dirty="0" err="1" smtClean="0"/>
@@ -7857,6 +8672,13 @@
   <p:clrMapOvr>
     <a:masterClrMapping/>
   </p:clrMapOvr>
+  <p:timing>
+    <p:tnLst>
+      <p:par>
+        <p:cTn id="1" dur="indefinite" restart="never" nodeType="tmRoot"/>
+      </p:par>
+    </p:tnLst>
+  </p:timing>
 </p:sld>
 </file>
 
@@ -8301,6 +9123,13 @@
   <p:clrMapOvr>
     <a:masterClrMapping/>
   </p:clrMapOvr>
+  <p:timing>
+    <p:tnLst>
+      <p:par>
+        <p:cTn id="1" dur="indefinite" restart="never" nodeType="tmRoot"/>
+      </p:par>
+    </p:tnLst>
+  </p:timing>
 </p:sld>
 </file>
 
@@ -8420,6 +9249,13 @@
   <p:clrMapOvr>
     <a:masterClrMapping/>
   </p:clrMapOvr>
+  <p:timing>
+    <p:tnLst>
+      <p:par>
+        <p:cTn id="1" dur="indefinite" restart="never" nodeType="tmRoot"/>
+      </p:par>
+    </p:tnLst>
+  </p:timing>
 </p:sld>
 </file>
 
@@ -8463,30 +9299,41 @@
           </a:p>
         </p:txBody>
       </p:sp>
-      <p:sp>
-        <p:nvSpPr>
-          <p:cNvPr id="3" name="Inhaltsplatzhalter 2"/>
-          <p:cNvSpPr>
-            <a:spLocks noGrp="1"/>
-          </p:cNvSpPr>
+      <p:pic>
+        <p:nvPicPr>
+          <p:cNvPr id="4" name="Inhaltsplatzhalter 3" descr="ESP_MIN.png"/>
+          <p:cNvPicPr>
+            <a:picLocks noGrp="1" noChangeAspect="1"/>
+          </p:cNvPicPr>
           <p:nvPr>
             <p:ph sz="quarter" idx="1"/>
           </p:nvPr>
-        </p:nvSpPr>
-        <p:spPr/>
-        <p:txBody>
-          <a:bodyPr/>
-          <a:lstStyle/>
-          <a:p>
-            <a:endParaRPr lang="en-US" dirty="0"/>
-          </a:p>
-        </p:txBody>
-      </p:sp>
+        </p:nvPicPr>
+        <p:blipFill>
+          <a:blip r:embed="rId2" cstate="print"/>
+          <a:stretch>
+            <a:fillRect/>
+          </a:stretch>
+        </p:blipFill>
+        <p:spPr>
+          <a:xfrm>
+            <a:off x="2023407" y="1527175"/>
+            <a:ext cx="5060674" cy="4572000"/>
+          </a:xfrm>
+        </p:spPr>
+      </p:pic>
     </p:spTree>
   </p:cSld>
   <p:clrMapOvr>
     <a:masterClrMapping/>
   </p:clrMapOvr>
+  <p:timing>
+    <p:tnLst>
+      <p:par>
+        <p:cTn id="1" dur="indefinite" restart="never" nodeType="tmRoot"/>
+      </p:par>
+    </p:tnLst>
+  </p:timing>
 </p:sld>
 </file>
 
@@ -8547,11 +9394,7 @@
           <a:p>
             <a:r>
               <a:rPr lang="en-US" dirty="0" smtClean="0"/>
-              <a:t>Many </a:t>
-            </a:r>
-            <a:r>
-              <a:rPr lang="en-US" dirty="0" smtClean="0"/>
-              <a:t>IDEs can be used, in my case </a:t>
+              <a:t>Many IDEs can be used, in my case </a:t>
             </a:r>
             <a:r>
               <a:rPr lang="en-US" dirty="0" err="1" smtClean="0"/>
@@ -8561,7 +9404,6 @@
               <a:rPr lang="en-US" dirty="0" smtClean="0"/>
               <a:t> IDE</a:t>
             </a:r>
-            <a:endParaRPr lang="en-US" dirty="0" smtClean="0"/>
           </a:p>
           <a:p>
             <a:pPr lvl="1"/>
@@ -8608,6 +9450,13 @@
   <p:clrMapOvr>
     <a:masterClrMapping/>
   </p:clrMapOvr>
+  <p:timing>
+    <p:tnLst>
+      <p:par>
+        <p:cTn id="1" dur="indefinite" restart="never" nodeType="tmRoot"/>
+      </p:par>
+    </p:tnLst>
+  </p:timing>
 </p:sld>
 </file>
 

</xml_diff>